<commit_message>
Atualizada apresentação pitch 0110
</commit_message>
<xml_diff>
--- a/PI-IES0202402/Apresentações/Pitch 011024.pptx
+++ b/PI-IES0202402/Apresentações/Pitch 011024.pptx
@@ -12,8 +12,11 @@
     <p:sldId id="260" r:id="rId6"/>
     <p:sldId id="261" r:id="rId7"/>
     <p:sldId id="262" r:id="rId8"/>
-    <p:sldId id="263" r:id="rId9"/>
-    <p:sldId id="264" r:id="rId10"/>
+    <p:sldId id="266" r:id="rId9"/>
+    <p:sldId id="265" r:id="rId10"/>
+    <p:sldId id="267" r:id="rId11"/>
+    <p:sldId id="263" r:id="rId12"/>
+    <p:sldId id="264" r:id="rId13"/>
   </p:sldIdLst>
   <p:sldSz cx="12192000" cy="6858000"/>
   <p:notesSz cx="6858000" cy="9144000"/>
@@ -112,7 +115,2562 @@
       </a:defRPr>
     </a:lvl9pPr>
   </p:defaultTextStyle>
+  <p:extLst>
+    <p:ext uri="{EFAFB233-063F-42B5-8137-9DF3F51BA10A}">
+      <p15:sldGuideLst xmlns:p15="http://schemas.microsoft.com/office/powerpoint/2012/main"/>
+    </p:ext>
+  </p:extLst>
 </p:presentation>
+</file>
+
+<file path=ppt/diagrams/colors1.xml><?xml version="1.0" encoding="utf-8"?>
+<dgm:colorsDef xmlns:dgm="http://schemas.openxmlformats.org/drawingml/2006/diagram" xmlns:a="http://schemas.openxmlformats.org/drawingml/2006/main" uniqueId="urn:microsoft.com/office/officeart/2018/5/colors/Iconchunking_coloredtext_accent0_3">
+  <dgm:title val=""/>
+  <dgm:desc val=""/>
+  <dgm:catLst>
+    <dgm:cat type="mainScheme" pri="10300"/>
+  </dgm:catLst>
+  <dgm:styleLbl name="node0">
+    <dgm:fillClrLst meth="repeat">
+      <a:schemeClr val="dk2"/>
+    </dgm:fillClrLst>
+    <dgm:linClrLst meth="repeat">
+      <a:schemeClr val="lt2"/>
+    </dgm:linClrLst>
+    <dgm:effectClrLst/>
+    <dgm:txLinClrLst/>
+    <dgm:txFillClrLst/>
+    <dgm:txEffectClrLst/>
+  </dgm:styleLbl>
+  <dgm:styleLbl name="alignNode1">
+    <dgm:fillClrLst meth="repeat">
+      <a:schemeClr val="dk2"/>
+    </dgm:fillClrLst>
+    <dgm:linClrLst meth="repeat">
+      <a:schemeClr val="dk2"/>
+    </dgm:linClrLst>
+    <dgm:effectClrLst/>
+    <dgm:txLinClrLst/>
+    <dgm:txFillClrLst/>
+    <dgm:txEffectClrLst/>
+  </dgm:styleLbl>
+  <dgm:styleLbl name="node1">
+    <dgm:fillClrLst meth="repeat">
+      <a:schemeClr val="bg1"/>
+    </dgm:fillClrLst>
+    <dgm:linClrLst meth="repeat">
+      <a:schemeClr val="lt2">
+        <a:alpha val="0"/>
+      </a:schemeClr>
+    </dgm:linClrLst>
+    <dgm:effectClrLst/>
+    <dgm:txLinClrLst/>
+    <dgm:txFillClrLst meth="repeat">
+      <a:schemeClr val="dk1"/>
+    </dgm:txFillClrLst>
+    <dgm:txEffectClrLst/>
+  </dgm:styleLbl>
+  <dgm:styleLbl name="lnNode1">
+    <dgm:fillClrLst meth="repeat">
+      <a:schemeClr val="dk2"/>
+    </dgm:fillClrLst>
+    <dgm:linClrLst meth="repeat">
+      <a:schemeClr val="lt2"/>
+    </dgm:linClrLst>
+    <dgm:effectClrLst/>
+    <dgm:txLinClrLst/>
+    <dgm:txFillClrLst/>
+    <dgm:txEffectClrLst/>
+  </dgm:styleLbl>
+  <dgm:styleLbl name="vennNode1">
+    <dgm:fillClrLst meth="repeat">
+      <a:schemeClr val="dk2">
+        <a:alpha val="50000"/>
+      </a:schemeClr>
+    </dgm:fillClrLst>
+    <dgm:linClrLst meth="repeat">
+      <a:schemeClr val="lt2"/>
+    </dgm:linClrLst>
+    <dgm:effectClrLst/>
+    <dgm:txLinClrLst/>
+    <dgm:txFillClrLst/>
+    <dgm:txEffectClrLst/>
+  </dgm:styleLbl>
+  <dgm:styleLbl name="node2">
+    <dgm:fillClrLst meth="repeat">
+      <a:schemeClr val="dk2"/>
+    </dgm:fillClrLst>
+    <dgm:linClrLst meth="repeat">
+      <a:schemeClr val="lt2"/>
+    </dgm:linClrLst>
+    <dgm:effectClrLst/>
+    <dgm:txLinClrLst/>
+    <dgm:txFillClrLst/>
+    <dgm:txEffectClrLst/>
+  </dgm:styleLbl>
+  <dgm:styleLbl name="node3">
+    <dgm:fillClrLst meth="repeat">
+      <a:schemeClr val="dk2"/>
+    </dgm:fillClrLst>
+    <dgm:linClrLst meth="repeat">
+      <a:schemeClr val="lt2"/>
+    </dgm:linClrLst>
+    <dgm:effectClrLst/>
+    <dgm:txLinClrLst/>
+    <dgm:txFillClrLst/>
+    <dgm:txEffectClrLst/>
+  </dgm:styleLbl>
+  <dgm:styleLbl name="node4">
+    <dgm:fillClrLst meth="repeat">
+      <a:schemeClr val="dk2"/>
+    </dgm:fillClrLst>
+    <dgm:linClrLst meth="repeat">
+      <a:schemeClr val="lt2"/>
+    </dgm:linClrLst>
+    <dgm:effectClrLst/>
+    <dgm:txLinClrLst/>
+    <dgm:txFillClrLst/>
+    <dgm:txEffectClrLst/>
+  </dgm:styleLbl>
+  <dgm:styleLbl name="fgImgPlace1">
+    <dgm:fillClrLst meth="repeat">
+      <a:schemeClr val="dk2">
+        <a:tint val="50000"/>
+      </a:schemeClr>
+    </dgm:fillClrLst>
+    <dgm:linClrLst meth="repeat">
+      <a:schemeClr val="lt2"/>
+    </dgm:linClrLst>
+    <dgm:effectClrLst/>
+    <dgm:txLinClrLst/>
+    <dgm:txFillClrLst meth="repeat">
+      <a:schemeClr val="lt2"/>
+    </dgm:txFillClrLst>
+    <dgm:txEffectClrLst/>
+  </dgm:styleLbl>
+  <dgm:styleLbl name="alignImgPlace1">
+    <dgm:fillClrLst meth="repeat">
+      <a:schemeClr val="dk2">
+        <a:tint val="50000"/>
+      </a:schemeClr>
+    </dgm:fillClrLst>
+    <dgm:linClrLst meth="repeat">
+      <a:schemeClr val="dk2">
+        <a:shade val="80000"/>
+      </a:schemeClr>
+    </dgm:linClrLst>
+    <dgm:effectClrLst/>
+    <dgm:txLinClrLst/>
+    <dgm:txFillClrLst meth="repeat">
+      <a:schemeClr val="lt2"/>
+    </dgm:txFillClrLst>
+    <dgm:txEffectClrLst/>
+  </dgm:styleLbl>
+  <dgm:styleLbl name="bgImgPlace1">
+    <dgm:fillClrLst meth="repeat">
+      <a:schemeClr val="dk2">
+        <a:tint val="50000"/>
+      </a:schemeClr>
+    </dgm:fillClrLst>
+    <dgm:linClrLst meth="repeat">
+      <a:schemeClr val="dk2">
+        <a:shade val="80000"/>
+      </a:schemeClr>
+    </dgm:linClrLst>
+    <dgm:effectClrLst/>
+    <dgm:txLinClrLst/>
+    <dgm:txFillClrLst meth="repeat">
+      <a:schemeClr val="lt2"/>
+    </dgm:txFillClrLst>
+    <dgm:txEffectClrLst/>
+  </dgm:styleLbl>
+  <dgm:styleLbl name="sibTrans2D1">
+    <dgm:fillClrLst meth="repeat">
+      <a:schemeClr val="dk2">
+        <a:tint val="60000"/>
+      </a:schemeClr>
+    </dgm:fillClrLst>
+    <dgm:linClrLst meth="repeat">
+      <a:schemeClr val="dk2">
+        <a:tint val="60000"/>
+      </a:schemeClr>
+    </dgm:linClrLst>
+    <dgm:effectClrLst/>
+    <dgm:txLinClrLst/>
+    <dgm:txFillClrLst/>
+    <dgm:txEffectClrLst/>
+  </dgm:styleLbl>
+  <dgm:styleLbl name="fgSibTrans2D1">
+    <dgm:fillClrLst meth="repeat">
+      <a:schemeClr val="dk2">
+        <a:tint val="60000"/>
+      </a:schemeClr>
+    </dgm:fillClrLst>
+    <dgm:linClrLst meth="repeat">
+      <a:schemeClr val="dk2">
+        <a:tint val="60000"/>
+      </a:schemeClr>
+    </dgm:linClrLst>
+    <dgm:effectClrLst/>
+    <dgm:txLinClrLst/>
+    <dgm:txFillClrLst/>
+    <dgm:txEffectClrLst/>
+  </dgm:styleLbl>
+  <dgm:styleLbl name="bgSibTrans2D1">
+    <dgm:fillClrLst meth="repeat">
+      <a:schemeClr val="dk2">
+        <a:tint val="60000"/>
+      </a:schemeClr>
+    </dgm:fillClrLst>
+    <dgm:linClrLst meth="repeat">
+      <a:schemeClr val="dk2">
+        <a:tint val="60000"/>
+      </a:schemeClr>
+    </dgm:linClrLst>
+    <dgm:effectClrLst/>
+    <dgm:txLinClrLst/>
+    <dgm:txFillClrLst/>
+    <dgm:txEffectClrLst/>
+  </dgm:styleLbl>
+  <dgm:styleLbl name="sibTrans1D1">
+    <dgm:fillClrLst meth="repeat">
+      <a:schemeClr val="dk2"/>
+    </dgm:fillClrLst>
+    <dgm:linClrLst meth="repeat">
+      <a:schemeClr val="dk2"/>
+    </dgm:linClrLst>
+    <dgm:effectClrLst/>
+    <dgm:txLinClrLst/>
+    <dgm:txFillClrLst meth="repeat">
+      <a:schemeClr val="lt2"/>
+    </dgm:txFillClrLst>
+    <dgm:txEffectClrLst/>
+  </dgm:styleLbl>
+  <dgm:styleLbl name="callout">
+    <dgm:fillClrLst meth="repeat">
+      <a:schemeClr val="dk2"/>
+    </dgm:fillClrLst>
+    <dgm:linClrLst meth="repeat">
+      <a:schemeClr val="dk2">
+        <a:tint val="50000"/>
+      </a:schemeClr>
+    </dgm:linClrLst>
+    <dgm:effectClrLst/>
+    <dgm:txLinClrLst/>
+    <dgm:txFillClrLst meth="repeat">
+      <a:schemeClr val="lt2"/>
+    </dgm:txFillClrLst>
+    <dgm:txEffectClrLst/>
+  </dgm:styleLbl>
+  <dgm:styleLbl name="asst0">
+    <dgm:fillClrLst meth="repeat">
+      <a:schemeClr val="dk2"/>
+    </dgm:fillClrLst>
+    <dgm:linClrLst meth="repeat">
+      <a:schemeClr val="lt2"/>
+    </dgm:linClrLst>
+    <dgm:effectClrLst/>
+    <dgm:txLinClrLst/>
+    <dgm:txFillClrLst/>
+    <dgm:txEffectClrLst/>
+  </dgm:styleLbl>
+  <dgm:styleLbl name="asst1">
+    <dgm:fillClrLst meth="repeat">
+      <a:schemeClr val="dk2"/>
+    </dgm:fillClrLst>
+    <dgm:linClrLst meth="repeat">
+      <a:schemeClr val="lt2"/>
+    </dgm:linClrLst>
+    <dgm:effectClrLst/>
+    <dgm:txLinClrLst/>
+    <dgm:txFillClrLst/>
+    <dgm:txEffectClrLst/>
+  </dgm:styleLbl>
+  <dgm:styleLbl name="asst2">
+    <dgm:fillClrLst meth="repeat">
+      <a:schemeClr val="dk2"/>
+    </dgm:fillClrLst>
+    <dgm:linClrLst meth="repeat">
+      <a:schemeClr val="lt2"/>
+    </dgm:linClrLst>
+    <dgm:effectClrLst/>
+    <dgm:txLinClrLst/>
+    <dgm:txFillClrLst/>
+    <dgm:txEffectClrLst/>
+  </dgm:styleLbl>
+  <dgm:styleLbl name="asst3">
+    <dgm:fillClrLst meth="repeat">
+      <a:schemeClr val="dk2"/>
+    </dgm:fillClrLst>
+    <dgm:linClrLst meth="repeat">
+      <a:schemeClr val="lt2"/>
+    </dgm:linClrLst>
+    <dgm:effectClrLst/>
+    <dgm:txLinClrLst/>
+    <dgm:txFillClrLst/>
+    <dgm:txEffectClrLst/>
+  </dgm:styleLbl>
+  <dgm:styleLbl name="asst4">
+    <dgm:fillClrLst meth="repeat">
+      <a:schemeClr val="dk2"/>
+    </dgm:fillClrLst>
+    <dgm:linClrLst meth="repeat">
+      <a:schemeClr val="lt2"/>
+    </dgm:linClrLst>
+    <dgm:effectClrLst/>
+    <dgm:txLinClrLst/>
+    <dgm:txFillClrLst/>
+    <dgm:txEffectClrLst/>
+  </dgm:styleLbl>
+  <dgm:styleLbl name="parChTrans2D1">
+    <dgm:fillClrLst meth="repeat">
+      <a:schemeClr val="dk2">
+        <a:tint val="60000"/>
+      </a:schemeClr>
+    </dgm:fillClrLst>
+    <dgm:linClrLst meth="repeat">
+      <a:schemeClr val="dk2">
+        <a:tint val="60000"/>
+      </a:schemeClr>
+    </dgm:linClrLst>
+    <dgm:effectClrLst/>
+    <dgm:txLinClrLst/>
+    <dgm:txFillClrLst meth="repeat">
+      <a:schemeClr val="lt2"/>
+    </dgm:txFillClrLst>
+    <dgm:txEffectClrLst/>
+  </dgm:styleLbl>
+  <dgm:styleLbl name="parChTrans2D2">
+    <dgm:fillClrLst meth="repeat">
+      <a:schemeClr val="dk2"/>
+    </dgm:fillClrLst>
+    <dgm:linClrLst meth="repeat">
+      <a:schemeClr val="dk2"/>
+    </dgm:linClrLst>
+    <dgm:effectClrLst/>
+    <dgm:txLinClrLst/>
+    <dgm:txFillClrLst meth="repeat">
+      <a:schemeClr val="lt2"/>
+    </dgm:txFillClrLst>
+    <dgm:txEffectClrLst/>
+  </dgm:styleLbl>
+  <dgm:styleLbl name="parChTrans2D3">
+    <dgm:fillClrLst meth="repeat">
+      <a:schemeClr val="dk2"/>
+    </dgm:fillClrLst>
+    <dgm:linClrLst meth="repeat">
+      <a:schemeClr val="dk2"/>
+    </dgm:linClrLst>
+    <dgm:effectClrLst/>
+    <dgm:txLinClrLst/>
+    <dgm:txFillClrLst meth="repeat">
+      <a:schemeClr val="lt2"/>
+    </dgm:txFillClrLst>
+    <dgm:txEffectClrLst/>
+  </dgm:styleLbl>
+  <dgm:styleLbl name="parChTrans2D4">
+    <dgm:fillClrLst meth="repeat">
+      <a:schemeClr val="dk2"/>
+    </dgm:fillClrLst>
+    <dgm:linClrLst meth="repeat">
+      <a:schemeClr val="dk2"/>
+    </dgm:linClrLst>
+    <dgm:effectClrLst/>
+    <dgm:txLinClrLst/>
+    <dgm:txFillClrLst meth="repeat">
+      <a:schemeClr val="lt2"/>
+    </dgm:txFillClrLst>
+    <dgm:txEffectClrLst/>
+  </dgm:styleLbl>
+  <dgm:styleLbl name="parChTrans1D1">
+    <dgm:fillClrLst meth="repeat">
+      <a:schemeClr val="dk2"/>
+    </dgm:fillClrLst>
+    <dgm:linClrLst meth="repeat">
+      <a:schemeClr val="dk2">
+        <a:shade val="60000"/>
+      </a:schemeClr>
+    </dgm:linClrLst>
+    <dgm:effectClrLst/>
+    <dgm:txLinClrLst/>
+    <dgm:txFillClrLst meth="repeat">
+      <a:schemeClr val="tx1"/>
+    </dgm:txFillClrLst>
+    <dgm:txEffectClrLst/>
+  </dgm:styleLbl>
+  <dgm:styleLbl name="parChTrans1D2">
+    <dgm:fillClrLst meth="repeat">
+      <a:schemeClr val="dk2"/>
+    </dgm:fillClrLst>
+    <dgm:linClrLst meth="repeat">
+      <a:schemeClr val="dk2">
+        <a:shade val="60000"/>
+      </a:schemeClr>
+    </dgm:linClrLst>
+    <dgm:effectClrLst/>
+    <dgm:txLinClrLst/>
+    <dgm:txFillClrLst meth="repeat">
+      <a:schemeClr val="tx1"/>
+    </dgm:txFillClrLst>
+    <dgm:txEffectClrLst/>
+  </dgm:styleLbl>
+  <dgm:styleLbl name="parChTrans1D3">
+    <dgm:fillClrLst meth="repeat">
+      <a:schemeClr val="dk2"/>
+    </dgm:fillClrLst>
+    <dgm:linClrLst meth="repeat">
+      <a:schemeClr val="dk2">
+        <a:shade val="80000"/>
+      </a:schemeClr>
+    </dgm:linClrLst>
+    <dgm:effectClrLst/>
+    <dgm:txLinClrLst/>
+    <dgm:txFillClrLst meth="repeat">
+      <a:schemeClr val="tx1"/>
+    </dgm:txFillClrLst>
+    <dgm:txEffectClrLst/>
+  </dgm:styleLbl>
+  <dgm:styleLbl name="parChTrans1D4">
+    <dgm:fillClrLst meth="repeat">
+      <a:schemeClr val="dk2"/>
+    </dgm:fillClrLst>
+    <dgm:linClrLst meth="repeat">
+      <a:schemeClr val="dk2">
+        <a:shade val="80000"/>
+      </a:schemeClr>
+    </dgm:linClrLst>
+    <dgm:effectClrLst/>
+    <dgm:txLinClrLst/>
+    <dgm:txFillClrLst meth="repeat">
+      <a:schemeClr val="tx1"/>
+    </dgm:txFillClrLst>
+    <dgm:txEffectClrLst/>
+  </dgm:styleLbl>
+  <dgm:styleLbl name="fgAcc1">
+    <dgm:fillClrLst meth="repeat">
+      <a:schemeClr val="lt2">
+        <a:alpha val="90000"/>
+      </a:schemeClr>
+    </dgm:fillClrLst>
+    <dgm:linClrLst meth="repeat">
+      <a:schemeClr val="dk2"/>
+    </dgm:linClrLst>
+    <dgm:effectClrLst/>
+    <dgm:txLinClrLst/>
+    <dgm:txFillClrLst meth="repeat">
+      <a:schemeClr val="dk1"/>
+    </dgm:txFillClrLst>
+    <dgm:txEffectClrLst/>
+  </dgm:styleLbl>
+  <dgm:styleLbl name="conFgAcc1">
+    <dgm:fillClrLst meth="repeat">
+      <a:schemeClr val="lt2">
+        <a:alpha val="90000"/>
+      </a:schemeClr>
+    </dgm:fillClrLst>
+    <dgm:linClrLst meth="repeat">
+      <a:schemeClr val="dk2"/>
+    </dgm:linClrLst>
+    <dgm:effectClrLst/>
+    <dgm:txLinClrLst/>
+    <dgm:txFillClrLst meth="repeat">
+      <a:schemeClr val="dk1"/>
+    </dgm:txFillClrLst>
+    <dgm:txEffectClrLst/>
+  </dgm:styleLbl>
+  <dgm:styleLbl name="alignAcc1">
+    <dgm:fillClrLst meth="repeat">
+      <a:schemeClr val="lt2">
+        <a:alpha val="90000"/>
+      </a:schemeClr>
+    </dgm:fillClrLst>
+    <dgm:linClrLst meth="repeat">
+      <a:schemeClr val="dk2"/>
+    </dgm:linClrLst>
+    <dgm:effectClrLst/>
+    <dgm:txLinClrLst/>
+    <dgm:txFillClrLst meth="repeat">
+      <a:schemeClr val="dk1"/>
+    </dgm:txFillClrLst>
+    <dgm:txEffectClrLst/>
+  </dgm:styleLbl>
+  <dgm:styleLbl name="trAlignAcc1">
+    <dgm:fillClrLst meth="repeat">
+      <a:schemeClr val="lt2">
+        <a:alpha val="0"/>
+      </a:schemeClr>
+    </dgm:fillClrLst>
+    <dgm:linClrLst meth="repeat">
+      <a:schemeClr val="dk2"/>
+    </dgm:linClrLst>
+    <dgm:effectClrLst/>
+    <dgm:txLinClrLst/>
+    <dgm:txFillClrLst meth="repeat">
+      <a:schemeClr val="dk1"/>
+    </dgm:txFillClrLst>
+    <dgm:txEffectClrLst/>
+  </dgm:styleLbl>
+  <dgm:styleLbl name="bgAcc1">
+    <dgm:fillClrLst meth="repeat">
+      <a:schemeClr val="lt2">
+        <a:alpha val="90000"/>
+      </a:schemeClr>
+    </dgm:fillClrLst>
+    <dgm:linClrLst meth="repeat">
+      <a:schemeClr val="dk2"/>
+    </dgm:linClrLst>
+    <dgm:effectClrLst/>
+    <dgm:txLinClrLst/>
+    <dgm:txFillClrLst meth="repeat">
+      <a:schemeClr val="dk1"/>
+    </dgm:txFillClrLst>
+    <dgm:txEffectClrLst/>
+  </dgm:styleLbl>
+  <dgm:styleLbl name="solidFgAcc1">
+    <dgm:fillClrLst meth="repeat">
+      <a:schemeClr val="lt2"/>
+    </dgm:fillClrLst>
+    <dgm:linClrLst meth="repeat">
+      <a:schemeClr val="dk2"/>
+    </dgm:linClrLst>
+    <dgm:effectClrLst/>
+    <dgm:txLinClrLst/>
+    <dgm:txFillClrLst meth="repeat">
+      <a:schemeClr val="dk1"/>
+    </dgm:txFillClrLst>
+    <dgm:txEffectClrLst/>
+  </dgm:styleLbl>
+  <dgm:styleLbl name="solidAlignAcc1">
+    <dgm:fillClrLst meth="repeat">
+      <a:schemeClr val="lt2"/>
+    </dgm:fillClrLst>
+    <dgm:linClrLst meth="repeat">
+      <a:schemeClr val="dk2"/>
+    </dgm:linClrLst>
+    <dgm:effectClrLst/>
+    <dgm:txLinClrLst/>
+    <dgm:txFillClrLst meth="repeat">
+      <a:schemeClr val="dk1"/>
+    </dgm:txFillClrLst>
+    <dgm:txEffectClrLst/>
+  </dgm:styleLbl>
+  <dgm:styleLbl name="solidBgAcc1">
+    <dgm:fillClrLst meth="repeat">
+      <a:schemeClr val="lt2"/>
+    </dgm:fillClrLst>
+    <dgm:linClrLst meth="repeat">
+      <a:schemeClr val="dk2"/>
+    </dgm:linClrLst>
+    <dgm:effectClrLst/>
+    <dgm:txLinClrLst/>
+    <dgm:txFillClrLst meth="repeat">
+      <a:schemeClr val="dk1"/>
+    </dgm:txFillClrLst>
+    <dgm:txEffectClrLst/>
+  </dgm:styleLbl>
+  <dgm:styleLbl name="fgAccFollowNode1">
+    <dgm:fillClrLst meth="repeat">
+      <a:schemeClr val="dk2">
+        <a:alpha val="90000"/>
+        <a:tint val="40000"/>
+      </a:schemeClr>
+    </dgm:fillClrLst>
+    <dgm:linClrLst meth="repeat">
+      <a:schemeClr val="dk2">
+        <a:alpha val="90000"/>
+        <a:tint val="40000"/>
+      </a:schemeClr>
+    </dgm:linClrLst>
+    <dgm:effectClrLst/>
+    <dgm:txLinClrLst/>
+    <dgm:txFillClrLst meth="repeat">
+      <a:schemeClr val="dk1"/>
+    </dgm:txFillClrLst>
+    <dgm:txEffectClrLst/>
+  </dgm:styleLbl>
+  <dgm:styleLbl name="alignAccFollowNode1">
+    <dgm:fillClrLst meth="repeat">
+      <a:schemeClr val="dk2">
+        <a:alpha val="90000"/>
+        <a:tint val="40000"/>
+      </a:schemeClr>
+    </dgm:fillClrLst>
+    <dgm:linClrLst meth="repeat">
+      <a:schemeClr val="dk2">
+        <a:alpha val="90000"/>
+        <a:tint val="40000"/>
+      </a:schemeClr>
+    </dgm:linClrLst>
+    <dgm:effectClrLst/>
+    <dgm:txLinClrLst/>
+    <dgm:txFillClrLst meth="repeat">
+      <a:schemeClr val="dk1"/>
+    </dgm:txFillClrLst>
+    <dgm:txEffectClrLst/>
+  </dgm:styleLbl>
+  <dgm:styleLbl name="bgAccFollowNode1">
+    <dgm:fillClrLst meth="repeat">
+      <a:schemeClr val="dk2">
+        <a:alpha val="90000"/>
+        <a:tint val="40000"/>
+      </a:schemeClr>
+    </dgm:fillClrLst>
+    <dgm:linClrLst meth="repeat">
+      <a:schemeClr val="dk2">
+        <a:alpha val="90000"/>
+        <a:tint val="40000"/>
+      </a:schemeClr>
+    </dgm:linClrLst>
+    <dgm:effectClrLst/>
+    <dgm:txLinClrLst/>
+    <dgm:txFillClrLst meth="repeat">
+      <a:schemeClr val="dk1"/>
+    </dgm:txFillClrLst>
+    <dgm:txEffectClrLst/>
+  </dgm:styleLbl>
+  <dgm:styleLbl name="fgAcc0">
+    <dgm:fillClrLst meth="repeat">
+      <a:schemeClr val="lt2">
+        <a:alpha val="90000"/>
+      </a:schemeClr>
+    </dgm:fillClrLst>
+    <dgm:linClrLst meth="repeat">
+      <a:schemeClr val="dk2"/>
+    </dgm:linClrLst>
+    <dgm:effectClrLst/>
+    <dgm:txLinClrLst/>
+    <dgm:txFillClrLst meth="repeat">
+      <a:schemeClr val="dk1"/>
+    </dgm:txFillClrLst>
+    <dgm:txEffectClrLst/>
+  </dgm:styleLbl>
+  <dgm:styleLbl name="fgAcc2">
+    <dgm:fillClrLst meth="repeat">
+      <a:schemeClr val="lt2">
+        <a:alpha val="90000"/>
+      </a:schemeClr>
+    </dgm:fillClrLst>
+    <dgm:linClrLst meth="repeat">
+      <a:schemeClr val="dk2"/>
+    </dgm:linClrLst>
+    <dgm:effectClrLst/>
+    <dgm:txLinClrLst/>
+    <dgm:txFillClrLst meth="repeat">
+      <a:schemeClr val="dk1"/>
+    </dgm:txFillClrLst>
+    <dgm:txEffectClrLst/>
+  </dgm:styleLbl>
+  <dgm:styleLbl name="fgAcc3">
+    <dgm:fillClrLst meth="repeat">
+      <a:schemeClr val="lt2">
+        <a:alpha val="90000"/>
+      </a:schemeClr>
+    </dgm:fillClrLst>
+    <dgm:linClrLst meth="repeat">
+      <a:schemeClr val="dk2"/>
+    </dgm:linClrLst>
+    <dgm:effectClrLst/>
+    <dgm:txLinClrLst/>
+    <dgm:txFillClrLst meth="repeat">
+      <a:schemeClr val="dk1"/>
+    </dgm:txFillClrLst>
+    <dgm:txEffectClrLst/>
+  </dgm:styleLbl>
+  <dgm:styleLbl name="fgAcc4">
+    <dgm:fillClrLst meth="repeat">
+      <a:schemeClr val="lt2">
+        <a:alpha val="90000"/>
+      </a:schemeClr>
+    </dgm:fillClrLst>
+    <dgm:linClrLst meth="repeat">
+      <a:schemeClr val="dk2"/>
+    </dgm:linClrLst>
+    <dgm:effectClrLst/>
+    <dgm:txLinClrLst/>
+    <dgm:txFillClrLst meth="repeat">
+      <a:schemeClr val="dk1"/>
+    </dgm:txFillClrLst>
+    <dgm:txEffectClrLst/>
+  </dgm:styleLbl>
+  <dgm:styleLbl name="bgShp">
+    <dgm:fillClrLst meth="repeat">
+      <a:schemeClr val="dk2"/>
+    </dgm:fillClrLst>
+    <dgm:linClrLst meth="repeat">
+      <a:schemeClr val="lt2">
+        <a:alpha val="0"/>
+      </a:schemeClr>
+    </dgm:linClrLst>
+    <dgm:effectClrLst/>
+    <dgm:txLinClrLst/>
+    <dgm:txFillClrLst/>
+    <dgm:txEffectClrLst/>
+  </dgm:styleLbl>
+  <dgm:styleLbl name="dkBgShp">
+    <dgm:fillClrLst meth="repeat">
+      <a:schemeClr val="dk2">
+        <a:shade val="80000"/>
+      </a:schemeClr>
+    </dgm:fillClrLst>
+    <dgm:linClrLst meth="repeat">
+      <a:schemeClr val="dk2"/>
+    </dgm:linClrLst>
+    <dgm:effectClrLst/>
+    <dgm:txLinClrLst/>
+    <dgm:txFillClrLst meth="repeat">
+      <a:schemeClr val="lt1"/>
+    </dgm:txFillClrLst>
+    <dgm:txEffectClrLst/>
+  </dgm:styleLbl>
+  <dgm:styleLbl name="trBgShp">
+    <dgm:fillClrLst meth="repeat">
+      <a:schemeClr val="dk2">
+        <a:tint val="50000"/>
+        <a:alpha val="40000"/>
+      </a:schemeClr>
+    </dgm:fillClrLst>
+    <dgm:linClrLst meth="repeat">
+      <a:schemeClr val="dk2"/>
+    </dgm:linClrLst>
+    <dgm:effectClrLst/>
+    <dgm:txLinClrLst/>
+    <dgm:txFillClrLst meth="repeat">
+      <a:schemeClr val="lt1"/>
+    </dgm:txFillClrLst>
+    <dgm:txEffectClrLst/>
+  </dgm:styleLbl>
+  <dgm:styleLbl name="fgShp">
+    <dgm:fillClrLst meth="repeat">
+      <a:schemeClr val="dk2">
+        <a:tint val="60000"/>
+      </a:schemeClr>
+    </dgm:fillClrLst>
+    <dgm:linClrLst meth="repeat">
+      <a:schemeClr val="lt2"/>
+    </dgm:linClrLst>
+    <dgm:effectClrLst/>
+    <dgm:txLinClrLst/>
+    <dgm:txFillClrLst meth="repeat">
+      <a:schemeClr val="dk1"/>
+    </dgm:txFillClrLst>
+    <dgm:txEffectClrLst/>
+  </dgm:styleLbl>
+  <dgm:styleLbl name="revTx">
+    <dgm:fillClrLst meth="repeat">
+      <a:schemeClr val="dk2">
+        <a:alpha val="0"/>
+      </a:schemeClr>
+    </dgm:fillClrLst>
+    <dgm:linClrLst meth="repeat">
+      <a:schemeClr val="dk2">
+        <a:alpha val="0"/>
+      </a:schemeClr>
+    </dgm:linClrLst>
+    <dgm:effectClrLst/>
+    <dgm:txLinClrLst/>
+    <dgm:txFillClrLst meth="repeat">
+      <a:schemeClr val="dk2"/>
+    </dgm:txFillClrLst>
+    <dgm:txEffectClrLst/>
+  </dgm:styleLbl>
+</dgm:colorsDef>
+</file>
+
+<file path=ppt/diagrams/data1.xml><?xml version="1.0" encoding="utf-8"?>
+<dgm:dataModel xmlns:dgm="http://schemas.openxmlformats.org/drawingml/2006/diagram" xmlns:a="http://schemas.openxmlformats.org/drawingml/2006/main">
+  <dgm:ptLst>
+    <dgm:pt modelId="{8067A57E-55CB-4F5B-A668-E16AE2BD02B1}" type="doc">
+      <dgm:prSet loTypeId="urn:microsoft.com/office/officeart/2018/5/layout/IconCircleLabelList" loCatId="icon" qsTypeId="urn:microsoft.com/office/officeart/2005/8/quickstyle/simple1" qsCatId="simple" csTypeId="urn:microsoft.com/office/officeart/2018/5/colors/Iconchunking_coloredtext_accent0_3" csCatId="mainScheme" phldr="1"/>
+      <dgm:spPr/>
+      <dgm:t>
+        <a:bodyPr/>
+        <a:lstStyle/>
+        <a:p>
+          <a:endParaRPr lang="en-US"/>
+        </a:p>
+      </dgm:t>
+    </dgm:pt>
+    <dgm:pt modelId="{5C3CD865-F353-47C9-A522-095EA389E1CB}">
+      <dgm:prSet/>
+      <dgm:spPr/>
+      <dgm:t>
+        <a:bodyPr/>
+        <a:lstStyle/>
+        <a:p>
+          <a:pPr>
+            <a:defRPr cap="all"/>
+          </a:pPr>
+          <a:r>
+            <a:rPr lang="pt-BR"/>
+            <a:t>Proposta de valor</a:t>
+          </a:r>
+          <a:endParaRPr lang="en-US"/>
+        </a:p>
+      </dgm:t>
+    </dgm:pt>
+    <dgm:pt modelId="{F8338523-4EFA-47D2-93BB-C647F3110B7A}" type="parTrans" cxnId="{3F0F503C-F6C0-4BC8-8658-AE9922DCD420}">
+      <dgm:prSet/>
+      <dgm:spPr/>
+      <dgm:t>
+        <a:bodyPr/>
+        <a:lstStyle/>
+        <a:p>
+          <a:endParaRPr lang="en-US"/>
+        </a:p>
+      </dgm:t>
+    </dgm:pt>
+    <dgm:pt modelId="{B4DD323F-5CF9-4B96-BBF1-10D736128F9E}" type="sibTrans" cxnId="{3F0F503C-F6C0-4BC8-8658-AE9922DCD420}">
+      <dgm:prSet/>
+      <dgm:spPr/>
+      <dgm:t>
+        <a:bodyPr/>
+        <a:lstStyle/>
+        <a:p>
+          <a:endParaRPr lang="en-US"/>
+        </a:p>
+      </dgm:t>
+    </dgm:pt>
+    <dgm:pt modelId="{A56C4458-154E-42F5-B08C-4AB84F3A2988}">
+      <dgm:prSet/>
+      <dgm:spPr/>
+      <dgm:t>
+        <a:bodyPr/>
+        <a:lstStyle/>
+        <a:p>
+          <a:pPr>
+            <a:defRPr cap="all"/>
+          </a:pPr>
+          <a:r>
+            <a:rPr lang="pt-BR"/>
+            <a:t>Próximos passos no desenvolvimento</a:t>
+          </a:r>
+          <a:endParaRPr lang="en-US"/>
+        </a:p>
+      </dgm:t>
+    </dgm:pt>
+    <dgm:pt modelId="{288190B5-BBA2-4DF4-985F-D77518C83623}" type="parTrans" cxnId="{29B32539-9502-48B8-BF8B-C86D8E24A71F}">
+      <dgm:prSet/>
+      <dgm:spPr/>
+      <dgm:t>
+        <a:bodyPr/>
+        <a:lstStyle/>
+        <a:p>
+          <a:endParaRPr lang="en-US"/>
+        </a:p>
+      </dgm:t>
+    </dgm:pt>
+    <dgm:pt modelId="{2388A591-7249-4837-935F-7C9094731A5D}" type="sibTrans" cxnId="{29B32539-9502-48B8-BF8B-C86D8E24A71F}">
+      <dgm:prSet/>
+      <dgm:spPr/>
+      <dgm:t>
+        <a:bodyPr/>
+        <a:lstStyle/>
+        <a:p>
+          <a:endParaRPr lang="en-US"/>
+        </a:p>
+      </dgm:t>
+    </dgm:pt>
+    <dgm:pt modelId="{B1B8D8CC-98D6-4F5B-A5E0-7E3ED06E765B}" type="pres">
+      <dgm:prSet presAssocID="{8067A57E-55CB-4F5B-A668-E16AE2BD02B1}" presName="root" presStyleCnt="0">
+        <dgm:presLayoutVars>
+          <dgm:dir/>
+          <dgm:resizeHandles val="exact"/>
+        </dgm:presLayoutVars>
+      </dgm:prSet>
+      <dgm:spPr/>
+    </dgm:pt>
+    <dgm:pt modelId="{95C47D11-56EE-49B3-B39E-FEFFE8CAFE31}" type="pres">
+      <dgm:prSet presAssocID="{5C3CD865-F353-47C9-A522-095EA389E1CB}" presName="compNode" presStyleCnt="0"/>
+      <dgm:spPr/>
+    </dgm:pt>
+    <dgm:pt modelId="{2E04BD10-1D41-4808-BC1B-1B798807A435}" type="pres">
+      <dgm:prSet presAssocID="{5C3CD865-F353-47C9-A522-095EA389E1CB}" presName="iconBgRect" presStyleLbl="bgShp" presStyleIdx="0" presStyleCnt="2"/>
+      <dgm:spPr/>
+    </dgm:pt>
+    <dgm:pt modelId="{1ED6CCF1-C383-45F0-8D7C-F53EB2FD391B}" type="pres">
+      <dgm:prSet presAssocID="{5C3CD865-F353-47C9-A522-095EA389E1CB}" presName="iconRect" presStyleLbl="node1" presStyleIdx="0" presStyleCnt="2"/>
+      <dgm:spPr>
+        <a:blipFill>
+          <a:blip xmlns:r="http://schemas.openxmlformats.org/officeDocument/2006/relationships" r:embed="rId1">
+            <a:extLst>
+              <a:ext uri="{28A0092B-C50C-407E-A947-70E740481C1C}">
+                <a14:useLocalDpi xmlns:a14="http://schemas.microsoft.com/office/drawing/2010/main" val="0"/>
+              </a:ext>
+              <a:ext uri="{96DAC541-7B7A-43D3-8B79-37D633B846F1}">
+                <asvg:svgBlip xmlns:asvg="http://schemas.microsoft.com/office/drawing/2016/SVG/main" r:embed="rId2"/>
+              </a:ext>
+            </a:extLst>
+          </a:blip>
+          <a:stretch>
+            <a:fillRect/>
+          </a:stretch>
+        </a:blipFill>
+        <a:ln>
+          <a:noFill/>
+        </a:ln>
+      </dgm:spPr>
+      <dgm:extLst>
+        <a:ext uri="{E40237B7-FDA0-4F09-8148-C483321AD2D9}">
+          <dgm14:cNvPr xmlns:dgm14="http://schemas.microsoft.com/office/drawing/2010/diagram" id="0" name="" descr="Dinheiro"/>
+        </a:ext>
+      </dgm:extLst>
+    </dgm:pt>
+    <dgm:pt modelId="{19794518-B538-484A-9BE7-D71389305AC3}" type="pres">
+      <dgm:prSet presAssocID="{5C3CD865-F353-47C9-A522-095EA389E1CB}" presName="spaceRect" presStyleCnt="0"/>
+      <dgm:spPr/>
+    </dgm:pt>
+    <dgm:pt modelId="{A012C08D-F261-446F-AD3C-EAABD8F9A267}" type="pres">
+      <dgm:prSet presAssocID="{5C3CD865-F353-47C9-A522-095EA389E1CB}" presName="textRect" presStyleLbl="revTx" presStyleIdx="0" presStyleCnt="2">
+        <dgm:presLayoutVars>
+          <dgm:chMax val="1"/>
+          <dgm:chPref val="1"/>
+        </dgm:presLayoutVars>
+      </dgm:prSet>
+      <dgm:spPr/>
+    </dgm:pt>
+    <dgm:pt modelId="{39B37C43-6B82-40B9-8ACE-FB98E29F07D0}" type="pres">
+      <dgm:prSet presAssocID="{B4DD323F-5CF9-4B96-BBF1-10D736128F9E}" presName="sibTrans" presStyleCnt="0"/>
+      <dgm:spPr/>
+    </dgm:pt>
+    <dgm:pt modelId="{76021605-C2B8-49BF-93F1-F50808BF3582}" type="pres">
+      <dgm:prSet presAssocID="{A56C4458-154E-42F5-B08C-4AB84F3A2988}" presName="compNode" presStyleCnt="0"/>
+      <dgm:spPr/>
+    </dgm:pt>
+    <dgm:pt modelId="{FBC17BF9-5C43-46DB-BA09-B02E22EE8BE2}" type="pres">
+      <dgm:prSet presAssocID="{A56C4458-154E-42F5-B08C-4AB84F3A2988}" presName="iconBgRect" presStyleLbl="bgShp" presStyleIdx="1" presStyleCnt="2"/>
+      <dgm:spPr/>
+    </dgm:pt>
+    <dgm:pt modelId="{E25409AA-C7FC-4BFD-81F5-5EE090E14AF3}" type="pres">
+      <dgm:prSet presAssocID="{A56C4458-154E-42F5-B08C-4AB84F3A2988}" presName="iconRect" presStyleLbl="node1" presStyleIdx="1" presStyleCnt="2"/>
+      <dgm:spPr>
+        <a:blipFill>
+          <a:blip xmlns:r="http://schemas.openxmlformats.org/officeDocument/2006/relationships" r:embed="rId3">
+            <a:extLst>
+              <a:ext uri="{28A0092B-C50C-407E-A947-70E740481C1C}">
+                <a14:useLocalDpi xmlns:a14="http://schemas.microsoft.com/office/drawing/2010/main" val="0"/>
+              </a:ext>
+              <a:ext uri="{96DAC541-7B7A-43D3-8B79-37D633B846F1}">
+                <asvg:svgBlip xmlns:asvg="http://schemas.microsoft.com/office/drawing/2016/SVG/main" r:embed="rId4"/>
+              </a:ext>
+            </a:extLst>
+          </a:blip>
+          <a:stretch>
+            <a:fillRect/>
+          </a:stretch>
+        </a:blipFill>
+        <a:ln>
+          <a:noFill/>
+        </a:ln>
+      </dgm:spPr>
+      <dgm:extLst>
+        <a:ext uri="{E40237B7-FDA0-4F09-8148-C483321AD2D9}">
+          <dgm14:cNvPr xmlns:dgm14="http://schemas.microsoft.com/office/drawing/2010/diagram" id="0" name="" descr="Pegadas de sapato"/>
+        </a:ext>
+      </dgm:extLst>
+    </dgm:pt>
+    <dgm:pt modelId="{90591C95-3B6A-47D2-B583-C2F7CA4288F7}" type="pres">
+      <dgm:prSet presAssocID="{A56C4458-154E-42F5-B08C-4AB84F3A2988}" presName="spaceRect" presStyleCnt="0"/>
+      <dgm:spPr/>
+    </dgm:pt>
+    <dgm:pt modelId="{FF69B329-9736-4EAD-83D5-82680BA373FD}" type="pres">
+      <dgm:prSet presAssocID="{A56C4458-154E-42F5-B08C-4AB84F3A2988}" presName="textRect" presStyleLbl="revTx" presStyleIdx="1" presStyleCnt="2">
+        <dgm:presLayoutVars>
+          <dgm:chMax val="1"/>
+          <dgm:chPref val="1"/>
+        </dgm:presLayoutVars>
+      </dgm:prSet>
+      <dgm:spPr/>
+    </dgm:pt>
+  </dgm:ptLst>
+  <dgm:cxnLst>
+    <dgm:cxn modelId="{29B32539-9502-48B8-BF8B-C86D8E24A71F}" srcId="{8067A57E-55CB-4F5B-A668-E16AE2BD02B1}" destId="{A56C4458-154E-42F5-B08C-4AB84F3A2988}" srcOrd="1" destOrd="0" parTransId="{288190B5-BBA2-4DF4-985F-D77518C83623}" sibTransId="{2388A591-7249-4837-935F-7C9094731A5D}"/>
+    <dgm:cxn modelId="{3F0F503C-F6C0-4BC8-8658-AE9922DCD420}" srcId="{8067A57E-55CB-4F5B-A668-E16AE2BD02B1}" destId="{5C3CD865-F353-47C9-A522-095EA389E1CB}" srcOrd="0" destOrd="0" parTransId="{F8338523-4EFA-47D2-93BB-C647F3110B7A}" sibTransId="{B4DD323F-5CF9-4B96-BBF1-10D736128F9E}"/>
+    <dgm:cxn modelId="{AB7BA340-A2DA-407E-B9F7-64DD23E1A060}" type="presOf" srcId="{8067A57E-55CB-4F5B-A668-E16AE2BD02B1}" destId="{B1B8D8CC-98D6-4F5B-A5E0-7E3ED06E765B}" srcOrd="0" destOrd="0" presId="urn:microsoft.com/office/officeart/2018/5/layout/IconCircleLabelList"/>
+    <dgm:cxn modelId="{01A7018C-8FD2-4F7B-892A-FF908F4F99EF}" type="presOf" srcId="{5C3CD865-F353-47C9-A522-095EA389E1CB}" destId="{A012C08D-F261-446F-AD3C-EAABD8F9A267}" srcOrd="0" destOrd="0" presId="urn:microsoft.com/office/officeart/2018/5/layout/IconCircleLabelList"/>
+    <dgm:cxn modelId="{D5780FA1-D623-44F6-93F9-D58A86681064}" type="presOf" srcId="{A56C4458-154E-42F5-B08C-4AB84F3A2988}" destId="{FF69B329-9736-4EAD-83D5-82680BA373FD}" srcOrd="0" destOrd="0" presId="urn:microsoft.com/office/officeart/2018/5/layout/IconCircleLabelList"/>
+    <dgm:cxn modelId="{E4597D84-3DBB-4AC0-B7DE-A829768ECE3D}" type="presParOf" srcId="{B1B8D8CC-98D6-4F5B-A5E0-7E3ED06E765B}" destId="{95C47D11-56EE-49B3-B39E-FEFFE8CAFE31}" srcOrd="0" destOrd="0" presId="urn:microsoft.com/office/officeart/2018/5/layout/IconCircleLabelList"/>
+    <dgm:cxn modelId="{E76DD193-738F-4B44-AB97-DBD8E0637003}" type="presParOf" srcId="{95C47D11-56EE-49B3-B39E-FEFFE8CAFE31}" destId="{2E04BD10-1D41-4808-BC1B-1B798807A435}" srcOrd="0" destOrd="0" presId="urn:microsoft.com/office/officeart/2018/5/layout/IconCircleLabelList"/>
+    <dgm:cxn modelId="{242A7312-E985-4364-8D63-EB0CBE6066BE}" type="presParOf" srcId="{95C47D11-56EE-49B3-B39E-FEFFE8CAFE31}" destId="{1ED6CCF1-C383-45F0-8D7C-F53EB2FD391B}" srcOrd="1" destOrd="0" presId="urn:microsoft.com/office/officeart/2018/5/layout/IconCircleLabelList"/>
+    <dgm:cxn modelId="{92FEB60A-0CFA-4CE7-B42E-30921A1567CC}" type="presParOf" srcId="{95C47D11-56EE-49B3-B39E-FEFFE8CAFE31}" destId="{19794518-B538-484A-9BE7-D71389305AC3}" srcOrd="2" destOrd="0" presId="urn:microsoft.com/office/officeart/2018/5/layout/IconCircleLabelList"/>
+    <dgm:cxn modelId="{6B539A11-0ECB-4944-AA56-AC20D2FCE238}" type="presParOf" srcId="{95C47D11-56EE-49B3-B39E-FEFFE8CAFE31}" destId="{A012C08D-F261-446F-AD3C-EAABD8F9A267}" srcOrd="3" destOrd="0" presId="urn:microsoft.com/office/officeart/2018/5/layout/IconCircleLabelList"/>
+    <dgm:cxn modelId="{E37175AA-C268-4930-91E4-A241AB19DA54}" type="presParOf" srcId="{B1B8D8CC-98D6-4F5B-A5E0-7E3ED06E765B}" destId="{39B37C43-6B82-40B9-8ACE-FB98E29F07D0}" srcOrd="1" destOrd="0" presId="urn:microsoft.com/office/officeart/2018/5/layout/IconCircleLabelList"/>
+    <dgm:cxn modelId="{8D16B482-6254-424B-B99F-F1AC5948725C}" type="presParOf" srcId="{B1B8D8CC-98D6-4F5B-A5E0-7E3ED06E765B}" destId="{76021605-C2B8-49BF-93F1-F50808BF3582}" srcOrd="2" destOrd="0" presId="urn:microsoft.com/office/officeart/2018/5/layout/IconCircleLabelList"/>
+    <dgm:cxn modelId="{11E642FA-7B34-461D-B907-3934D156F02C}" type="presParOf" srcId="{76021605-C2B8-49BF-93F1-F50808BF3582}" destId="{FBC17BF9-5C43-46DB-BA09-B02E22EE8BE2}" srcOrd="0" destOrd="0" presId="urn:microsoft.com/office/officeart/2018/5/layout/IconCircleLabelList"/>
+    <dgm:cxn modelId="{648DEAD8-9B9C-424D-BB58-1A74821ACC87}" type="presParOf" srcId="{76021605-C2B8-49BF-93F1-F50808BF3582}" destId="{E25409AA-C7FC-4BFD-81F5-5EE090E14AF3}" srcOrd="1" destOrd="0" presId="urn:microsoft.com/office/officeart/2018/5/layout/IconCircleLabelList"/>
+    <dgm:cxn modelId="{5D1458CF-973D-42F8-B475-A877E692B002}" type="presParOf" srcId="{76021605-C2B8-49BF-93F1-F50808BF3582}" destId="{90591C95-3B6A-47D2-B583-C2F7CA4288F7}" srcOrd="2" destOrd="0" presId="urn:microsoft.com/office/officeart/2018/5/layout/IconCircleLabelList"/>
+    <dgm:cxn modelId="{A5D37938-2BFB-484A-998A-3AC181CC35E4}" type="presParOf" srcId="{76021605-C2B8-49BF-93F1-F50808BF3582}" destId="{FF69B329-9736-4EAD-83D5-82680BA373FD}" srcOrd="3" destOrd="0" presId="urn:microsoft.com/office/officeart/2018/5/layout/IconCircleLabelList"/>
+  </dgm:cxnLst>
+  <dgm:bg/>
+  <dgm:whole/>
+  <dgm:extLst>
+    <a:ext uri="http://schemas.microsoft.com/office/drawing/2008/diagram">
+      <dsp:dataModelExt xmlns:dsp="http://schemas.microsoft.com/office/drawing/2008/diagram" relId="rId6" minVer="http://schemas.openxmlformats.org/drawingml/2006/diagram"/>
+    </a:ext>
+  </dgm:extLst>
+</dgm:dataModel>
+</file>
+
+<file path=ppt/diagrams/drawing1.xml><?xml version="1.0" encoding="utf-8"?>
+<dsp:drawing xmlns:dgm="http://schemas.openxmlformats.org/drawingml/2006/diagram" xmlns:dsp="http://schemas.microsoft.com/office/drawing/2008/diagram" xmlns:a="http://schemas.openxmlformats.org/drawingml/2006/main">
+  <dsp:spTree>
+    <dsp:nvGrpSpPr>
+      <dsp:cNvPr id="0" name=""/>
+      <dsp:cNvGrpSpPr/>
+    </dsp:nvGrpSpPr>
+    <dsp:grpSpPr/>
+    <dsp:sp modelId="{2E04BD10-1D41-4808-BC1B-1B798807A435}">
+      <dsp:nvSpPr>
+        <dsp:cNvPr id="0" name=""/>
+        <dsp:cNvSpPr/>
+      </dsp:nvSpPr>
+      <dsp:spPr>
+        <a:xfrm>
+          <a:off x="2303514" y="294614"/>
+          <a:ext cx="2196000" cy="2196000"/>
+        </a:xfrm>
+        <a:prstGeom prst="ellipse">
+          <a:avLst/>
+        </a:prstGeom>
+        <a:solidFill>
+          <a:schemeClr val="dk2">
+            <a:hueOff val="0"/>
+            <a:satOff val="0"/>
+            <a:lumOff val="0"/>
+            <a:alphaOff val="0"/>
+          </a:schemeClr>
+        </a:solidFill>
+        <a:ln>
+          <a:noFill/>
+        </a:ln>
+        <a:effectLst/>
+      </dsp:spPr>
+      <dsp:style>
+        <a:lnRef idx="0">
+          <a:scrgbClr r="0" g="0" b="0"/>
+        </a:lnRef>
+        <a:fillRef idx="1">
+          <a:scrgbClr r="0" g="0" b="0"/>
+        </a:fillRef>
+        <a:effectRef idx="0">
+          <a:scrgbClr r="0" g="0" b="0"/>
+        </a:effectRef>
+        <a:fontRef idx="minor"/>
+      </dsp:style>
+    </dsp:sp>
+    <dsp:sp modelId="{1ED6CCF1-C383-45F0-8D7C-F53EB2FD391B}">
+      <dsp:nvSpPr>
+        <dsp:cNvPr id="0" name=""/>
+        <dsp:cNvSpPr/>
+      </dsp:nvSpPr>
+      <dsp:spPr>
+        <a:xfrm>
+          <a:off x="2771514" y="762614"/>
+          <a:ext cx="1260000" cy="1260000"/>
+        </a:xfrm>
+        <a:prstGeom prst="rect">
+          <a:avLst/>
+        </a:prstGeom>
+        <a:blipFill>
+          <a:blip xmlns:r="http://schemas.openxmlformats.org/officeDocument/2006/relationships" r:embed="rId1">
+            <a:extLst>
+              <a:ext uri="{28A0092B-C50C-407E-A947-70E740481C1C}">
+                <a14:useLocalDpi xmlns:a14="http://schemas.microsoft.com/office/drawing/2010/main" val="0"/>
+              </a:ext>
+              <a:ext uri="{96DAC541-7B7A-43D3-8B79-37D633B846F1}">
+                <asvg:svgBlip xmlns:asvg="http://schemas.microsoft.com/office/drawing/2016/SVG/main" r:embed="rId2"/>
+              </a:ext>
+            </a:extLst>
+          </a:blip>
+          <a:stretch>
+            <a:fillRect/>
+          </a:stretch>
+        </a:blipFill>
+        <a:ln w="12700" cap="flat" cmpd="sng" algn="ctr">
+          <a:noFill/>
+          <a:prstDash val="solid"/>
+          <a:miter lim="800000"/>
+        </a:ln>
+        <a:effectLst/>
+      </dsp:spPr>
+      <dsp:style>
+        <a:lnRef idx="2">
+          <a:scrgbClr r="0" g="0" b="0"/>
+        </a:lnRef>
+        <a:fillRef idx="1">
+          <a:scrgbClr r="0" g="0" b="0"/>
+        </a:fillRef>
+        <a:effectRef idx="0">
+          <a:scrgbClr r="0" g="0" b="0"/>
+        </a:effectRef>
+        <a:fontRef idx="minor">
+          <a:schemeClr val="lt1"/>
+        </a:fontRef>
+      </dsp:style>
+    </dsp:sp>
+    <dsp:sp modelId="{A012C08D-F261-446F-AD3C-EAABD8F9A267}">
+      <dsp:nvSpPr>
+        <dsp:cNvPr id="0" name=""/>
+        <dsp:cNvSpPr/>
+      </dsp:nvSpPr>
+      <dsp:spPr>
+        <a:xfrm>
+          <a:off x="1601514" y="3174614"/>
+          <a:ext cx="3600000" cy="720000"/>
+        </a:xfrm>
+        <a:prstGeom prst="rect">
+          <a:avLst/>
+        </a:prstGeom>
+        <a:noFill/>
+        <a:ln>
+          <a:noFill/>
+        </a:ln>
+        <a:effectLst/>
+      </dsp:spPr>
+      <dsp:style>
+        <a:lnRef idx="0">
+          <a:scrgbClr r="0" g="0" b="0"/>
+        </a:lnRef>
+        <a:fillRef idx="0">
+          <a:scrgbClr r="0" g="0" b="0"/>
+        </a:fillRef>
+        <a:effectRef idx="0">
+          <a:scrgbClr r="0" g="0" b="0"/>
+        </a:effectRef>
+        <a:fontRef idx="minor"/>
+      </dsp:style>
+      <dsp:txBody>
+        <a:bodyPr spcFirstLastPara="0" vert="horz" wrap="square" lIns="0" tIns="0" rIns="0" bIns="0" numCol="1" spcCol="1270" anchor="t" anchorCtr="0">
+          <a:noAutofit/>
+        </a:bodyPr>
+        <a:lstStyle/>
+        <a:p>
+          <a:pPr marL="0" lvl="0" indent="0" algn="ctr" defTabSz="1111250">
+            <a:lnSpc>
+              <a:spcPct val="90000"/>
+            </a:lnSpc>
+            <a:spcBef>
+              <a:spcPct val="0"/>
+            </a:spcBef>
+            <a:spcAft>
+              <a:spcPct val="35000"/>
+            </a:spcAft>
+            <a:buNone/>
+            <a:defRPr cap="all"/>
+          </a:pPr>
+          <a:r>
+            <a:rPr lang="pt-BR" sz="2500" kern="1200"/>
+            <a:t>Proposta de valor</a:t>
+          </a:r>
+          <a:endParaRPr lang="en-US" sz="2500" kern="1200"/>
+        </a:p>
+      </dsp:txBody>
+      <dsp:txXfrm>
+        <a:off x="1601514" y="3174614"/>
+        <a:ext cx="3600000" cy="720000"/>
+      </dsp:txXfrm>
+    </dsp:sp>
+    <dsp:sp modelId="{FBC17BF9-5C43-46DB-BA09-B02E22EE8BE2}">
+      <dsp:nvSpPr>
+        <dsp:cNvPr id="0" name=""/>
+        <dsp:cNvSpPr/>
+      </dsp:nvSpPr>
+      <dsp:spPr>
+        <a:xfrm>
+          <a:off x="6533514" y="294614"/>
+          <a:ext cx="2196000" cy="2196000"/>
+        </a:xfrm>
+        <a:prstGeom prst="ellipse">
+          <a:avLst/>
+        </a:prstGeom>
+        <a:solidFill>
+          <a:schemeClr val="dk2">
+            <a:hueOff val="0"/>
+            <a:satOff val="0"/>
+            <a:lumOff val="0"/>
+            <a:alphaOff val="0"/>
+          </a:schemeClr>
+        </a:solidFill>
+        <a:ln>
+          <a:noFill/>
+        </a:ln>
+        <a:effectLst/>
+      </dsp:spPr>
+      <dsp:style>
+        <a:lnRef idx="0">
+          <a:scrgbClr r="0" g="0" b="0"/>
+        </a:lnRef>
+        <a:fillRef idx="1">
+          <a:scrgbClr r="0" g="0" b="0"/>
+        </a:fillRef>
+        <a:effectRef idx="0">
+          <a:scrgbClr r="0" g="0" b="0"/>
+        </a:effectRef>
+        <a:fontRef idx="minor"/>
+      </dsp:style>
+    </dsp:sp>
+    <dsp:sp modelId="{E25409AA-C7FC-4BFD-81F5-5EE090E14AF3}">
+      <dsp:nvSpPr>
+        <dsp:cNvPr id="0" name=""/>
+        <dsp:cNvSpPr/>
+      </dsp:nvSpPr>
+      <dsp:spPr>
+        <a:xfrm>
+          <a:off x="7001514" y="762614"/>
+          <a:ext cx="1260000" cy="1260000"/>
+        </a:xfrm>
+        <a:prstGeom prst="rect">
+          <a:avLst/>
+        </a:prstGeom>
+        <a:blipFill>
+          <a:blip xmlns:r="http://schemas.openxmlformats.org/officeDocument/2006/relationships" r:embed="rId3">
+            <a:extLst>
+              <a:ext uri="{28A0092B-C50C-407E-A947-70E740481C1C}">
+                <a14:useLocalDpi xmlns:a14="http://schemas.microsoft.com/office/drawing/2010/main" val="0"/>
+              </a:ext>
+              <a:ext uri="{96DAC541-7B7A-43D3-8B79-37D633B846F1}">
+                <asvg:svgBlip xmlns:asvg="http://schemas.microsoft.com/office/drawing/2016/SVG/main" r:embed="rId4"/>
+              </a:ext>
+            </a:extLst>
+          </a:blip>
+          <a:stretch>
+            <a:fillRect/>
+          </a:stretch>
+        </a:blipFill>
+        <a:ln w="12700" cap="flat" cmpd="sng" algn="ctr">
+          <a:noFill/>
+          <a:prstDash val="solid"/>
+          <a:miter lim="800000"/>
+        </a:ln>
+        <a:effectLst/>
+      </dsp:spPr>
+      <dsp:style>
+        <a:lnRef idx="2">
+          <a:scrgbClr r="0" g="0" b="0"/>
+        </a:lnRef>
+        <a:fillRef idx="1">
+          <a:scrgbClr r="0" g="0" b="0"/>
+        </a:fillRef>
+        <a:effectRef idx="0">
+          <a:scrgbClr r="0" g="0" b="0"/>
+        </a:effectRef>
+        <a:fontRef idx="minor">
+          <a:schemeClr val="lt1"/>
+        </a:fontRef>
+      </dsp:style>
+    </dsp:sp>
+    <dsp:sp modelId="{FF69B329-9736-4EAD-83D5-82680BA373FD}">
+      <dsp:nvSpPr>
+        <dsp:cNvPr id="0" name=""/>
+        <dsp:cNvSpPr/>
+      </dsp:nvSpPr>
+      <dsp:spPr>
+        <a:xfrm>
+          <a:off x="5831514" y="3174614"/>
+          <a:ext cx="3600000" cy="720000"/>
+        </a:xfrm>
+        <a:prstGeom prst="rect">
+          <a:avLst/>
+        </a:prstGeom>
+        <a:noFill/>
+        <a:ln>
+          <a:noFill/>
+        </a:ln>
+        <a:effectLst/>
+      </dsp:spPr>
+      <dsp:style>
+        <a:lnRef idx="0">
+          <a:scrgbClr r="0" g="0" b="0"/>
+        </a:lnRef>
+        <a:fillRef idx="0">
+          <a:scrgbClr r="0" g="0" b="0"/>
+        </a:fillRef>
+        <a:effectRef idx="0">
+          <a:scrgbClr r="0" g="0" b="0"/>
+        </a:effectRef>
+        <a:fontRef idx="minor"/>
+      </dsp:style>
+      <dsp:txBody>
+        <a:bodyPr spcFirstLastPara="0" vert="horz" wrap="square" lIns="0" tIns="0" rIns="0" bIns="0" numCol="1" spcCol="1270" anchor="t" anchorCtr="0">
+          <a:noAutofit/>
+        </a:bodyPr>
+        <a:lstStyle/>
+        <a:p>
+          <a:pPr marL="0" lvl="0" indent="0" algn="ctr" defTabSz="1111250">
+            <a:lnSpc>
+              <a:spcPct val="90000"/>
+            </a:lnSpc>
+            <a:spcBef>
+              <a:spcPct val="0"/>
+            </a:spcBef>
+            <a:spcAft>
+              <a:spcPct val="35000"/>
+            </a:spcAft>
+            <a:buNone/>
+            <a:defRPr cap="all"/>
+          </a:pPr>
+          <a:r>
+            <a:rPr lang="pt-BR" sz="2500" kern="1200"/>
+            <a:t>Próximos passos no desenvolvimento</a:t>
+          </a:r>
+          <a:endParaRPr lang="en-US" sz="2500" kern="1200"/>
+        </a:p>
+      </dsp:txBody>
+      <dsp:txXfrm>
+        <a:off x="5831514" y="3174614"/>
+        <a:ext cx="3600000" cy="720000"/>
+      </dsp:txXfrm>
+    </dsp:sp>
+  </dsp:spTree>
+</dsp:drawing>
+</file>
+
+<file path=ppt/diagrams/layout1.xml><?xml version="1.0" encoding="utf-8"?>
+<dgm:layoutDef xmlns:dgm="http://schemas.openxmlformats.org/drawingml/2006/diagram" xmlns:a="http://schemas.openxmlformats.org/drawingml/2006/main" uniqueId="urn:microsoft.com/office/officeart/2018/5/layout/IconCircleLabelList">
+  <dgm:title val="Icon Circle Label List"/>
+  <dgm:desc val="Use to show non-sequential or grouped chunks of information accompanied by a related visuals. Works best with icons or small pictures with short text captions."/>
+  <dgm:catLst>
+    <dgm:cat type="icon" pri="500"/>
+  </dgm:catLst>
+  <dgm:sampData useDef="1">
+    <dgm:dataModel>
+      <dgm:ptLst/>
+      <dgm:bg/>
+      <dgm:whole/>
+    </dgm:dataModel>
+  </dgm:sampData>
+  <dgm:styleData useDef="1">
+    <dgm:dataModel>
+      <dgm:ptLst/>
+      <dgm:bg/>
+      <dgm:whole/>
+    </dgm:dataModel>
+  </dgm:styleData>
+  <dgm:clrData useDef="1">
+    <dgm:dataModel>
+      <dgm:ptLst/>
+      <dgm:bg/>
+      <dgm:whole/>
+    </dgm:dataModel>
+  </dgm:clrData>
+  <dgm:layoutNode name="root">
+    <dgm:varLst>
+      <dgm:dir/>
+      <dgm:resizeHandles val="exact"/>
+    </dgm:varLst>
+    <dgm:choose name="Name0">
+      <dgm:if name="Name1" axis="self" func="var" arg="dir" op="equ" val="norm">
+        <dgm:alg type="snake">
+          <dgm:param type="grDir" val="tL"/>
+          <dgm:param type="flowDir" val="row"/>
+          <dgm:param type="contDir" val="sameDir"/>
+          <dgm:param type="off" val="ctr"/>
+          <dgm:param type="vertAlign" val="mid"/>
+          <dgm:param type="horzAlign" val="ctr"/>
+        </dgm:alg>
+      </dgm:if>
+      <dgm:else name="Name2">
+        <dgm:alg type="snake">
+          <dgm:param type="grDir" val="tR"/>
+          <dgm:param type="flowDir" val="row"/>
+          <dgm:param type="contDir" val="sameDir"/>
+          <dgm:param type="off" val="ctr"/>
+          <dgm:param type="vertAlign" val="mid"/>
+          <dgm:param type="horzAlign" val="ctr"/>
+        </dgm:alg>
+      </dgm:else>
+    </dgm:choose>
+    <dgm:shape xmlns:r="http://schemas.openxmlformats.org/officeDocument/2006/relationships" r:blip="">
+      <dgm:adjLst/>
+    </dgm:shape>
+    <dgm:presOf/>
+    <dgm:choose name="Name3">
+      <dgm:if name="Name4" axis="ch" ptType="node" func="cnt" op="lte" val="2">
+        <dgm:constrLst>
+          <dgm:constr type="h" for="ch" forName="compNode" refType="h" fact="0.4"/>
+          <dgm:constr type="w" for="ch" forName="compNode" val="100"/>
+          <dgm:constr type="w" for="ch" forName="sibTrans" refType="w" refFor="ch" refForName="compNode" fact="0.175"/>
+          <dgm:constr type="sp" refType="w" refFor="ch" refForName="compNode" op="equ" fact="0.25"/>
+          <dgm:constr type="primFontSz" for="des" ptType="node" op="equ" val="44"/>
+          <dgm:constr type="h" for="des" forName="compNode" op="equ"/>
+          <dgm:constr type="h" for="des" forName="textRect" op="equ"/>
+        </dgm:constrLst>
+      </dgm:if>
+      <dgm:if name="Name5" axis="ch" ptType="node" func="cnt" op="lte" val="3">
+        <dgm:constrLst>
+          <dgm:constr type="h" for="ch" forName="compNode" refType="h" fact="0.4"/>
+          <dgm:constr type="w" for="ch" forName="compNode" val="100"/>
+          <dgm:constr type="w" for="ch" forName="sibTrans" refType="w" refFor="ch" refForName="compNode" fact="0.175"/>
+          <dgm:constr type="sp" refType="w" refFor="ch" refForName="compNode" op="equ" fact="0.25"/>
+          <dgm:constr type="primFontSz" for="des" ptType="node" op="equ" val="40"/>
+          <dgm:constr type="h" for="des" forName="compNode" op="equ"/>
+          <dgm:constr type="h" for="des" forName="textRect" op="equ"/>
+        </dgm:constrLst>
+      </dgm:if>
+      <dgm:if name="Name6" axis="ch" ptType="node" func="cnt" op="lte" val="4">
+        <dgm:constrLst>
+          <dgm:constr type="h" for="ch" forName="compNode" refType="h" fact="0.4"/>
+          <dgm:constr type="w" for="ch" forName="compNode" refType="w"/>
+          <dgm:constr type="w" for="ch" forName="sibTrans" refType="w" refFor="ch" refForName="compNode" fact="0.175"/>
+          <dgm:constr type="sp" refType="w" refFor="ch" refForName="compNode" op="equ" fact="0.25"/>
+          <dgm:constr type="primFontSz" for="des" ptType="node" op="equ" val="32"/>
+          <dgm:constr type="h" for="des" forName="compNode" op="equ"/>
+          <dgm:constr type="h" for="des" forName="textRect" op="equ"/>
+        </dgm:constrLst>
+      </dgm:if>
+      <dgm:else name="Name7">
+        <dgm:constrLst>
+          <dgm:constr type="h" for="ch" forName="compNode" refType="h" fact="0.4"/>
+          <dgm:constr type="w" for="ch" forName="compNode" refType="w"/>
+          <dgm:constr type="w" for="ch" forName="sibTrans" refType="w" refFor="ch" refForName="compNode" fact="0.175"/>
+          <dgm:constr type="sp" refType="w" refFor="ch" refForName="compNode" op="equ" fact="0.25"/>
+          <dgm:constr type="primFontSz" for="des" ptType="node" op="equ" val="24"/>
+          <dgm:constr type="h" for="des" forName="compNode" op="equ"/>
+          <dgm:constr type="h" for="des" forName="textRect" op="equ"/>
+        </dgm:constrLst>
+      </dgm:else>
+    </dgm:choose>
+    <dgm:ruleLst>
+      <dgm:rule type="w" for="ch" forName="compNode" val="50" fact="NaN" max="NaN"/>
+    </dgm:ruleLst>
+    <dgm:forEach name="Name8" axis="ch" ptType="node">
+      <dgm:layoutNode name="compNode">
+        <dgm:alg type="composite"/>
+        <dgm:shape xmlns:r="http://schemas.openxmlformats.org/officeDocument/2006/relationships" r:blip="">
+          <dgm:adjLst/>
+        </dgm:shape>
+        <dgm:presOf axis="self"/>
+        <dgm:constrLst>
+          <dgm:constr type="w" for="ch" forName="iconBgRect" refType="w" fact="0.61"/>
+          <dgm:constr type="h" for="ch" forName="iconBgRect" refType="w" refFor="ch" refForName="iconBgRect"/>
+          <dgm:constr type="t" for="ch" forName="iconBgRect"/>
+          <dgm:constr type="ctrX" for="ch" forName="iconBgRect" refType="w" fact="0.5"/>
+          <dgm:constr type="w" for="ch" forName="iconRect" refType="w" fact="0.35"/>
+          <dgm:constr type="h" for="ch" forName="iconRect" refType="w" refFor="ch" refForName="iconRect"/>
+          <dgm:constr type="ctrX" for="ch" forName="iconRect" refType="ctrX" refFor="ch" refForName="iconBgRect"/>
+          <dgm:constr type="ctrY" for="ch" forName="iconRect" refType="ctrY" refFor="ch" refForName="iconBgRect"/>
+          <dgm:constr type="h" for="ch" forName="spaceRect" refType="w" fact="0.19"/>
+          <dgm:constr type="w" for="ch" forName="spaceRect" refType="w"/>
+          <dgm:constr type="l" for="ch" forName="spaceRect"/>
+          <dgm:constr type="t" for="ch" forName="spaceRect" refType="b" refFor="ch" refForName="iconBgRect"/>
+          <dgm:constr type="h" for="ch" forName="textRect" val="20"/>
+          <dgm:constr type="w" for="ch" forName="textRect" refType="w"/>
+          <dgm:constr type="l" for="ch" forName="textRect"/>
+          <dgm:constr type="t" for="ch" forName="textRect" refType="b" refFor="ch" refForName="spaceRect"/>
+        </dgm:constrLst>
+        <dgm:ruleLst>
+          <dgm:rule type="h" val="INF" fact="NaN" max="NaN"/>
+        </dgm:ruleLst>
+        <dgm:layoutNode name="iconBgRect" styleLbl="bgShp">
+          <dgm:alg type="sp"/>
+          <dgm:shape xmlns:r="http://schemas.openxmlformats.org/officeDocument/2006/relationships" type="ellipse" r:blip="">
+            <dgm:adjLst/>
+          </dgm:shape>
+          <dgm:presOf/>
+          <dgm:constrLst/>
+          <dgm:ruleLst/>
+        </dgm:layoutNode>
+        <dgm:layoutNode name="iconRect" styleLbl="node1">
+          <dgm:alg type="sp"/>
+          <dgm:shape xmlns:r="http://schemas.openxmlformats.org/officeDocument/2006/relationships" type="rect" r:blip="" blipPhldr="1">
+            <dgm:adjLst/>
+          </dgm:shape>
+          <dgm:presOf/>
+          <dgm:constrLst/>
+          <dgm:ruleLst/>
+        </dgm:layoutNode>
+        <dgm:layoutNode name="spaceRect">
+          <dgm:alg type="sp"/>
+          <dgm:shape xmlns:r="http://schemas.openxmlformats.org/officeDocument/2006/relationships" r:blip="">
+            <dgm:adjLst/>
+          </dgm:shape>
+          <dgm:presOf/>
+          <dgm:constrLst/>
+          <dgm:ruleLst/>
+        </dgm:layoutNode>
+        <dgm:layoutNode name="textRect" styleLbl="revTx">
+          <dgm:varLst>
+            <dgm:chMax val="1"/>
+            <dgm:chPref val="1"/>
+          </dgm:varLst>
+          <dgm:alg type="tx">
+            <dgm:param type="txAnchorVert" val="t"/>
+          </dgm:alg>
+          <dgm:shape xmlns:r="http://schemas.openxmlformats.org/officeDocument/2006/relationships" type="rect" r:blip="">
+            <dgm:adjLst/>
+          </dgm:shape>
+          <dgm:presOf axis="self" ptType="node"/>
+          <dgm:constrLst>
+            <dgm:constr type="lMarg"/>
+            <dgm:constr type="rMarg"/>
+            <dgm:constr type="tMarg"/>
+            <dgm:constr type="bMarg"/>
+          </dgm:constrLst>
+          <dgm:ruleLst>
+            <dgm:rule type="primFontSz" val="11" fact="NaN" max="NaN"/>
+            <dgm:rule type="h" val="INF" fact="NaN" max="NaN"/>
+          </dgm:ruleLst>
+        </dgm:layoutNode>
+      </dgm:layoutNode>
+      <dgm:forEach name="Name9" axis="followSib" ptType="sibTrans" cnt="1">
+        <dgm:layoutNode name="sibTrans">
+          <dgm:alg type="sp"/>
+          <dgm:shape xmlns:r="http://schemas.openxmlformats.org/officeDocument/2006/relationships" r:blip="">
+            <dgm:adjLst/>
+          </dgm:shape>
+          <dgm:presOf axis="self"/>
+          <dgm:constrLst/>
+          <dgm:ruleLst/>
+        </dgm:layoutNode>
+      </dgm:forEach>
+    </dgm:forEach>
+  </dgm:layoutNode>
+  <dgm:extLst>
+    <a:ext uri="{68A01E43-0DF5-4B5B-8FA6-DAF915123BFB}">
+      <dgm1612:lstStyle xmlns:dgm1612="http://schemas.microsoft.com/office/drawing/2016/12/diagram">
+        <a:lvl1pPr>
+          <a:lnSpc>
+            <a:spcPct val="100000"/>
+          </a:lnSpc>
+          <a:defRPr cap="all"/>
+        </a:lvl1pPr>
+      </dgm1612:lstStyle>
+    </a:ext>
+  </dgm:extLst>
+</dgm:layoutDef>
+</file>
+
+<file path=ppt/diagrams/quickStyle1.xml><?xml version="1.0" encoding="utf-8"?>
+<dgm:styleDef xmlns:dgm="http://schemas.openxmlformats.org/drawingml/2006/diagram" xmlns:a="http://schemas.openxmlformats.org/drawingml/2006/main" uniqueId="urn:microsoft.com/office/officeart/2005/8/quickstyle/simple1">
+  <dgm:title val=""/>
+  <dgm:desc val=""/>
+  <dgm:catLst>
+    <dgm:cat type="simple" pri="10100"/>
+  </dgm:catLst>
+  <dgm:scene3d>
+    <a:camera prst="orthographicFront"/>
+    <a:lightRig rig="threePt" dir="t"/>
+  </dgm:scene3d>
+  <dgm:styleLbl name="node0">
+    <dgm:scene3d>
+      <a:camera prst="orthographicFront"/>
+      <a:lightRig rig="threePt" dir="t"/>
+    </dgm:scene3d>
+    <dgm:sp3d/>
+    <dgm:txPr/>
+    <dgm:style>
+      <a:lnRef idx="2">
+        <a:scrgbClr r="0" g="0" b="0"/>
+      </a:lnRef>
+      <a:fillRef idx="1">
+        <a:scrgbClr r="0" g="0" b="0"/>
+      </a:fillRef>
+      <a:effectRef idx="0">
+        <a:scrgbClr r="0" g="0" b="0"/>
+      </a:effectRef>
+      <a:fontRef idx="minor">
+        <a:schemeClr val="lt1"/>
+      </a:fontRef>
+    </dgm:style>
+  </dgm:styleLbl>
+  <dgm:styleLbl name="lnNode1">
+    <dgm:scene3d>
+      <a:camera prst="orthographicFront"/>
+      <a:lightRig rig="threePt" dir="t"/>
+    </dgm:scene3d>
+    <dgm:sp3d/>
+    <dgm:txPr/>
+    <dgm:style>
+      <a:lnRef idx="2">
+        <a:scrgbClr r="0" g="0" b="0"/>
+      </a:lnRef>
+      <a:fillRef idx="1">
+        <a:scrgbClr r="0" g="0" b="0"/>
+      </a:fillRef>
+      <a:effectRef idx="0">
+        <a:scrgbClr r="0" g="0" b="0"/>
+      </a:effectRef>
+      <a:fontRef idx="minor">
+        <a:schemeClr val="lt1"/>
+      </a:fontRef>
+    </dgm:style>
+  </dgm:styleLbl>
+  <dgm:styleLbl name="vennNode1">
+    <dgm:scene3d>
+      <a:camera prst="orthographicFront"/>
+      <a:lightRig rig="threePt" dir="t"/>
+    </dgm:scene3d>
+    <dgm:sp3d/>
+    <dgm:txPr/>
+    <dgm:style>
+      <a:lnRef idx="2">
+        <a:scrgbClr r="0" g="0" b="0"/>
+      </a:lnRef>
+      <a:fillRef idx="1">
+        <a:scrgbClr r="0" g="0" b="0"/>
+      </a:fillRef>
+      <a:effectRef idx="0">
+        <a:scrgbClr r="0" g="0" b="0"/>
+      </a:effectRef>
+      <a:fontRef idx="minor">
+        <a:schemeClr val="tx1"/>
+      </a:fontRef>
+    </dgm:style>
+  </dgm:styleLbl>
+  <dgm:styleLbl name="alignNode1">
+    <dgm:scene3d>
+      <a:camera prst="orthographicFront"/>
+      <a:lightRig rig="threePt" dir="t"/>
+    </dgm:scene3d>
+    <dgm:sp3d/>
+    <dgm:txPr/>
+    <dgm:style>
+      <a:lnRef idx="2">
+        <a:scrgbClr r="0" g="0" b="0"/>
+      </a:lnRef>
+      <a:fillRef idx="1">
+        <a:scrgbClr r="0" g="0" b="0"/>
+      </a:fillRef>
+      <a:effectRef idx="0">
+        <a:scrgbClr r="0" g="0" b="0"/>
+      </a:effectRef>
+      <a:fontRef idx="minor">
+        <a:schemeClr val="lt1"/>
+      </a:fontRef>
+    </dgm:style>
+  </dgm:styleLbl>
+  <dgm:styleLbl name="node1">
+    <dgm:scene3d>
+      <a:camera prst="orthographicFront"/>
+      <a:lightRig rig="threePt" dir="t"/>
+    </dgm:scene3d>
+    <dgm:sp3d/>
+    <dgm:txPr/>
+    <dgm:style>
+      <a:lnRef idx="2">
+        <a:scrgbClr r="0" g="0" b="0"/>
+      </a:lnRef>
+      <a:fillRef idx="1">
+        <a:scrgbClr r="0" g="0" b="0"/>
+      </a:fillRef>
+      <a:effectRef idx="0">
+        <a:scrgbClr r="0" g="0" b="0"/>
+      </a:effectRef>
+      <a:fontRef idx="minor">
+        <a:schemeClr val="lt1"/>
+      </a:fontRef>
+    </dgm:style>
+  </dgm:styleLbl>
+  <dgm:styleLbl name="node2">
+    <dgm:scene3d>
+      <a:camera prst="orthographicFront"/>
+      <a:lightRig rig="threePt" dir="t"/>
+    </dgm:scene3d>
+    <dgm:sp3d/>
+    <dgm:txPr/>
+    <dgm:style>
+      <a:lnRef idx="2">
+        <a:scrgbClr r="0" g="0" b="0"/>
+      </a:lnRef>
+      <a:fillRef idx="1">
+        <a:scrgbClr r="0" g="0" b="0"/>
+      </a:fillRef>
+      <a:effectRef idx="0">
+        <a:scrgbClr r="0" g="0" b="0"/>
+      </a:effectRef>
+      <a:fontRef idx="minor">
+        <a:schemeClr val="lt1"/>
+      </a:fontRef>
+    </dgm:style>
+  </dgm:styleLbl>
+  <dgm:styleLbl name="node3">
+    <dgm:scene3d>
+      <a:camera prst="orthographicFront"/>
+      <a:lightRig rig="threePt" dir="t"/>
+    </dgm:scene3d>
+    <dgm:sp3d/>
+    <dgm:txPr/>
+    <dgm:style>
+      <a:lnRef idx="2">
+        <a:scrgbClr r="0" g="0" b="0"/>
+      </a:lnRef>
+      <a:fillRef idx="1">
+        <a:scrgbClr r="0" g="0" b="0"/>
+      </a:fillRef>
+      <a:effectRef idx="0">
+        <a:scrgbClr r="0" g="0" b="0"/>
+      </a:effectRef>
+      <a:fontRef idx="minor">
+        <a:schemeClr val="lt1"/>
+      </a:fontRef>
+    </dgm:style>
+  </dgm:styleLbl>
+  <dgm:styleLbl name="node4">
+    <dgm:scene3d>
+      <a:camera prst="orthographicFront"/>
+      <a:lightRig rig="threePt" dir="t"/>
+    </dgm:scene3d>
+    <dgm:sp3d/>
+    <dgm:txPr/>
+    <dgm:style>
+      <a:lnRef idx="2">
+        <a:scrgbClr r="0" g="0" b="0"/>
+      </a:lnRef>
+      <a:fillRef idx="1">
+        <a:scrgbClr r="0" g="0" b="0"/>
+      </a:fillRef>
+      <a:effectRef idx="0">
+        <a:scrgbClr r="0" g="0" b="0"/>
+      </a:effectRef>
+      <a:fontRef idx="minor">
+        <a:schemeClr val="lt1"/>
+      </a:fontRef>
+    </dgm:style>
+  </dgm:styleLbl>
+  <dgm:styleLbl name="fgImgPlace1">
+    <dgm:scene3d>
+      <a:camera prst="orthographicFront"/>
+      <a:lightRig rig="threePt" dir="t"/>
+    </dgm:scene3d>
+    <dgm:sp3d/>
+    <dgm:txPr/>
+    <dgm:style>
+      <a:lnRef idx="2">
+        <a:scrgbClr r="0" g="0" b="0"/>
+      </a:lnRef>
+      <a:fillRef idx="1">
+        <a:scrgbClr r="0" g="0" b="0"/>
+      </a:fillRef>
+      <a:effectRef idx="0">
+        <a:scrgbClr r="0" g="0" b="0"/>
+      </a:effectRef>
+      <a:fontRef idx="minor"/>
+    </dgm:style>
+  </dgm:styleLbl>
+  <dgm:styleLbl name="alignImgPlace1">
+    <dgm:scene3d>
+      <a:camera prst="orthographicFront"/>
+      <a:lightRig rig="threePt" dir="t"/>
+    </dgm:scene3d>
+    <dgm:sp3d/>
+    <dgm:txPr/>
+    <dgm:style>
+      <a:lnRef idx="2">
+        <a:scrgbClr r="0" g="0" b="0"/>
+      </a:lnRef>
+      <a:fillRef idx="1">
+        <a:scrgbClr r="0" g="0" b="0"/>
+      </a:fillRef>
+      <a:effectRef idx="0">
+        <a:scrgbClr r="0" g="0" b="0"/>
+      </a:effectRef>
+      <a:fontRef idx="minor"/>
+    </dgm:style>
+  </dgm:styleLbl>
+  <dgm:styleLbl name="bgImgPlace1">
+    <dgm:scene3d>
+      <a:camera prst="orthographicFront"/>
+      <a:lightRig rig="threePt" dir="t"/>
+    </dgm:scene3d>
+    <dgm:sp3d/>
+    <dgm:txPr/>
+    <dgm:style>
+      <a:lnRef idx="2">
+        <a:scrgbClr r="0" g="0" b="0"/>
+      </a:lnRef>
+      <a:fillRef idx="1">
+        <a:scrgbClr r="0" g="0" b="0"/>
+      </a:fillRef>
+      <a:effectRef idx="0">
+        <a:scrgbClr r="0" g="0" b="0"/>
+      </a:effectRef>
+      <a:fontRef idx="minor"/>
+    </dgm:style>
+  </dgm:styleLbl>
+  <dgm:styleLbl name="sibTrans2D1">
+    <dgm:scene3d>
+      <a:camera prst="orthographicFront"/>
+      <a:lightRig rig="threePt" dir="t"/>
+    </dgm:scene3d>
+    <dgm:sp3d/>
+    <dgm:txPr/>
+    <dgm:style>
+      <a:lnRef idx="0">
+        <a:scrgbClr r="0" g="0" b="0"/>
+      </a:lnRef>
+      <a:fillRef idx="1">
+        <a:scrgbClr r="0" g="0" b="0"/>
+      </a:fillRef>
+      <a:effectRef idx="0">
+        <a:scrgbClr r="0" g="0" b="0"/>
+      </a:effectRef>
+      <a:fontRef idx="minor">
+        <a:schemeClr val="lt1"/>
+      </a:fontRef>
+    </dgm:style>
+  </dgm:styleLbl>
+  <dgm:styleLbl name="fgSibTrans2D1">
+    <dgm:scene3d>
+      <a:camera prst="orthographicFront"/>
+      <a:lightRig rig="threePt" dir="t"/>
+    </dgm:scene3d>
+    <dgm:sp3d/>
+    <dgm:txPr/>
+    <dgm:style>
+      <a:lnRef idx="0">
+        <a:scrgbClr r="0" g="0" b="0"/>
+      </a:lnRef>
+      <a:fillRef idx="1">
+        <a:scrgbClr r="0" g="0" b="0"/>
+      </a:fillRef>
+      <a:effectRef idx="0">
+        <a:scrgbClr r="0" g="0" b="0"/>
+      </a:effectRef>
+      <a:fontRef idx="minor">
+        <a:schemeClr val="lt1"/>
+      </a:fontRef>
+    </dgm:style>
+  </dgm:styleLbl>
+  <dgm:styleLbl name="bgSibTrans2D1">
+    <dgm:scene3d>
+      <a:camera prst="orthographicFront"/>
+      <a:lightRig rig="threePt" dir="t"/>
+    </dgm:scene3d>
+    <dgm:sp3d/>
+    <dgm:txPr/>
+    <dgm:style>
+      <a:lnRef idx="0">
+        <a:scrgbClr r="0" g="0" b="0"/>
+      </a:lnRef>
+      <a:fillRef idx="1">
+        <a:scrgbClr r="0" g="0" b="0"/>
+      </a:fillRef>
+      <a:effectRef idx="0">
+        <a:scrgbClr r="0" g="0" b="0"/>
+      </a:effectRef>
+      <a:fontRef idx="minor">
+        <a:schemeClr val="lt1"/>
+      </a:fontRef>
+    </dgm:style>
+  </dgm:styleLbl>
+  <dgm:styleLbl name="sibTrans1D1">
+    <dgm:scene3d>
+      <a:camera prst="orthographicFront"/>
+      <a:lightRig rig="threePt" dir="t"/>
+    </dgm:scene3d>
+    <dgm:sp3d/>
+    <dgm:txPr/>
+    <dgm:style>
+      <a:lnRef idx="1">
+        <a:scrgbClr r="0" g="0" b="0"/>
+      </a:lnRef>
+      <a:fillRef idx="0">
+        <a:scrgbClr r="0" g="0" b="0"/>
+      </a:fillRef>
+      <a:effectRef idx="0">
+        <a:scrgbClr r="0" g="0" b="0"/>
+      </a:effectRef>
+      <a:fontRef idx="minor"/>
+    </dgm:style>
+  </dgm:styleLbl>
+  <dgm:styleLbl name="callout">
+    <dgm:scene3d>
+      <a:camera prst="orthographicFront"/>
+      <a:lightRig rig="threePt" dir="t"/>
+    </dgm:scene3d>
+    <dgm:sp3d/>
+    <dgm:txPr/>
+    <dgm:style>
+      <a:lnRef idx="2">
+        <a:scrgbClr r="0" g="0" b="0"/>
+      </a:lnRef>
+      <a:fillRef idx="1">
+        <a:scrgbClr r="0" g="0" b="0"/>
+      </a:fillRef>
+      <a:effectRef idx="0">
+        <a:scrgbClr r="0" g="0" b="0"/>
+      </a:effectRef>
+      <a:fontRef idx="minor"/>
+    </dgm:style>
+  </dgm:styleLbl>
+  <dgm:styleLbl name="asst0">
+    <dgm:scene3d>
+      <a:camera prst="orthographicFront"/>
+      <a:lightRig rig="threePt" dir="t"/>
+    </dgm:scene3d>
+    <dgm:sp3d/>
+    <dgm:txPr/>
+    <dgm:style>
+      <a:lnRef idx="2">
+        <a:scrgbClr r="0" g="0" b="0"/>
+      </a:lnRef>
+      <a:fillRef idx="1">
+        <a:scrgbClr r="0" g="0" b="0"/>
+      </a:fillRef>
+      <a:effectRef idx="0">
+        <a:scrgbClr r="0" g="0" b="0"/>
+      </a:effectRef>
+      <a:fontRef idx="minor">
+        <a:schemeClr val="lt1"/>
+      </a:fontRef>
+    </dgm:style>
+  </dgm:styleLbl>
+  <dgm:styleLbl name="asst1">
+    <dgm:scene3d>
+      <a:camera prst="orthographicFront"/>
+      <a:lightRig rig="threePt" dir="t"/>
+    </dgm:scene3d>
+    <dgm:sp3d/>
+    <dgm:txPr/>
+    <dgm:style>
+      <a:lnRef idx="2">
+        <a:scrgbClr r="0" g="0" b="0"/>
+      </a:lnRef>
+      <a:fillRef idx="1">
+        <a:scrgbClr r="0" g="0" b="0"/>
+      </a:fillRef>
+      <a:effectRef idx="0">
+        <a:scrgbClr r="0" g="0" b="0"/>
+      </a:effectRef>
+      <a:fontRef idx="minor">
+        <a:schemeClr val="lt1"/>
+      </a:fontRef>
+    </dgm:style>
+  </dgm:styleLbl>
+  <dgm:styleLbl name="asst2">
+    <dgm:scene3d>
+      <a:camera prst="orthographicFront"/>
+      <a:lightRig rig="threePt" dir="t"/>
+    </dgm:scene3d>
+    <dgm:sp3d/>
+    <dgm:txPr/>
+    <dgm:style>
+      <a:lnRef idx="2">
+        <a:scrgbClr r="0" g="0" b="0"/>
+      </a:lnRef>
+      <a:fillRef idx="1">
+        <a:scrgbClr r="0" g="0" b="0"/>
+      </a:fillRef>
+      <a:effectRef idx="0">
+        <a:scrgbClr r="0" g="0" b="0"/>
+      </a:effectRef>
+      <a:fontRef idx="minor">
+        <a:schemeClr val="lt1"/>
+      </a:fontRef>
+    </dgm:style>
+  </dgm:styleLbl>
+  <dgm:styleLbl name="asst3">
+    <dgm:scene3d>
+      <a:camera prst="orthographicFront"/>
+      <a:lightRig rig="threePt" dir="t"/>
+    </dgm:scene3d>
+    <dgm:sp3d/>
+    <dgm:txPr/>
+    <dgm:style>
+      <a:lnRef idx="2">
+        <a:scrgbClr r="0" g="0" b="0"/>
+      </a:lnRef>
+      <a:fillRef idx="1">
+        <a:scrgbClr r="0" g="0" b="0"/>
+      </a:fillRef>
+      <a:effectRef idx="0">
+        <a:scrgbClr r="0" g="0" b="0"/>
+      </a:effectRef>
+      <a:fontRef idx="minor">
+        <a:schemeClr val="lt1"/>
+      </a:fontRef>
+    </dgm:style>
+  </dgm:styleLbl>
+  <dgm:styleLbl name="asst4">
+    <dgm:scene3d>
+      <a:camera prst="orthographicFront"/>
+      <a:lightRig rig="threePt" dir="t"/>
+    </dgm:scene3d>
+    <dgm:sp3d/>
+    <dgm:txPr/>
+    <dgm:style>
+      <a:lnRef idx="2">
+        <a:scrgbClr r="0" g="0" b="0"/>
+      </a:lnRef>
+      <a:fillRef idx="1">
+        <a:scrgbClr r="0" g="0" b="0"/>
+      </a:fillRef>
+      <a:effectRef idx="0">
+        <a:scrgbClr r="0" g="0" b="0"/>
+      </a:effectRef>
+      <a:fontRef idx="minor">
+        <a:schemeClr val="lt1"/>
+      </a:fontRef>
+    </dgm:style>
+  </dgm:styleLbl>
+  <dgm:styleLbl name="parChTrans2D1">
+    <dgm:scene3d>
+      <a:camera prst="orthographicFront"/>
+      <a:lightRig rig="threePt" dir="t"/>
+    </dgm:scene3d>
+    <dgm:sp3d/>
+    <dgm:txPr/>
+    <dgm:style>
+      <a:lnRef idx="2">
+        <a:scrgbClr r="0" g="0" b="0"/>
+      </a:lnRef>
+      <a:fillRef idx="1">
+        <a:scrgbClr r="0" g="0" b="0"/>
+      </a:fillRef>
+      <a:effectRef idx="0">
+        <a:scrgbClr r="0" g="0" b="0"/>
+      </a:effectRef>
+      <a:fontRef idx="minor">
+        <a:schemeClr val="lt1"/>
+      </a:fontRef>
+    </dgm:style>
+  </dgm:styleLbl>
+  <dgm:styleLbl name="parChTrans2D2">
+    <dgm:scene3d>
+      <a:camera prst="orthographicFront"/>
+      <a:lightRig rig="threePt" dir="t"/>
+    </dgm:scene3d>
+    <dgm:sp3d/>
+    <dgm:txPr/>
+    <dgm:style>
+      <a:lnRef idx="2">
+        <a:scrgbClr r="0" g="0" b="0"/>
+      </a:lnRef>
+      <a:fillRef idx="1">
+        <a:scrgbClr r="0" g="0" b="0"/>
+      </a:fillRef>
+      <a:effectRef idx="0">
+        <a:scrgbClr r="0" g="0" b="0"/>
+      </a:effectRef>
+      <a:fontRef idx="minor">
+        <a:schemeClr val="lt1"/>
+      </a:fontRef>
+    </dgm:style>
+  </dgm:styleLbl>
+  <dgm:styleLbl name="parChTrans2D3">
+    <dgm:scene3d>
+      <a:camera prst="orthographicFront"/>
+      <a:lightRig rig="threePt" dir="t"/>
+    </dgm:scene3d>
+    <dgm:sp3d/>
+    <dgm:txPr/>
+    <dgm:style>
+      <a:lnRef idx="2">
+        <a:scrgbClr r="0" g="0" b="0"/>
+      </a:lnRef>
+      <a:fillRef idx="1">
+        <a:scrgbClr r="0" g="0" b="0"/>
+      </a:fillRef>
+      <a:effectRef idx="0">
+        <a:scrgbClr r="0" g="0" b="0"/>
+      </a:effectRef>
+      <a:fontRef idx="minor">
+        <a:schemeClr val="lt1"/>
+      </a:fontRef>
+    </dgm:style>
+  </dgm:styleLbl>
+  <dgm:styleLbl name="parChTrans2D4">
+    <dgm:scene3d>
+      <a:camera prst="orthographicFront"/>
+      <a:lightRig rig="threePt" dir="t"/>
+    </dgm:scene3d>
+    <dgm:sp3d/>
+    <dgm:txPr/>
+    <dgm:style>
+      <a:lnRef idx="2">
+        <a:scrgbClr r="0" g="0" b="0"/>
+      </a:lnRef>
+      <a:fillRef idx="1">
+        <a:scrgbClr r="0" g="0" b="0"/>
+      </a:fillRef>
+      <a:effectRef idx="0">
+        <a:scrgbClr r="0" g="0" b="0"/>
+      </a:effectRef>
+      <a:fontRef idx="minor">
+        <a:schemeClr val="lt1"/>
+      </a:fontRef>
+    </dgm:style>
+  </dgm:styleLbl>
+  <dgm:styleLbl name="parChTrans1D1">
+    <dgm:scene3d>
+      <a:camera prst="orthographicFront"/>
+      <a:lightRig rig="threePt" dir="t"/>
+    </dgm:scene3d>
+    <dgm:sp3d/>
+    <dgm:txPr/>
+    <dgm:style>
+      <a:lnRef idx="2">
+        <a:scrgbClr r="0" g="0" b="0"/>
+      </a:lnRef>
+      <a:fillRef idx="0">
+        <a:scrgbClr r="0" g="0" b="0"/>
+      </a:fillRef>
+      <a:effectRef idx="0">
+        <a:scrgbClr r="0" g="0" b="0"/>
+      </a:effectRef>
+      <a:fontRef idx="minor"/>
+    </dgm:style>
+  </dgm:styleLbl>
+  <dgm:styleLbl name="parChTrans1D2">
+    <dgm:scene3d>
+      <a:camera prst="orthographicFront"/>
+      <a:lightRig rig="threePt" dir="t"/>
+    </dgm:scene3d>
+    <dgm:sp3d/>
+    <dgm:txPr/>
+    <dgm:style>
+      <a:lnRef idx="2">
+        <a:scrgbClr r="0" g="0" b="0"/>
+      </a:lnRef>
+      <a:fillRef idx="0">
+        <a:scrgbClr r="0" g="0" b="0"/>
+      </a:fillRef>
+      <a:effectRef idx="0">
+        <a:scrgbClr r="0" g="0" b="0"/>
+      </a:effectRef>
+      <a:fontRef idx="minor"/>
+    </dgm:style>
+  </dgm:styleLbl>
+  <dgm:styleLbl name="parChTrans1D3">
+    <dgm:scene3d>
+      <a:camera prst="orthographicFront"/>
+      <a:lightRig rig="threePt" dir="t"/>
+    </dgm:scene3d>
+    <dgm:sp3d/>
+    <dgm:txPr/>
+    <dgm:style>
+      <a:lnRef idx="2">
+        <a:scrgbClr r="0" g="0" b="0"/>
+      </a:lnRef>
+      <a:fillRef idx="0">
+        <a:scrgbClr r="0" g="0" b="0"/>
+      </a:fillRef>
+      <a:effectRef idx="0">
+        <a:scrgbClr r="0" g="0" b="0"/>
+      </a:effectRef>
+      <a:fontRef idx="minor"/>
+    </dgm:style>
+  </dgm:styleLbl>
+  <dgm:styleLbl name="parChTrans1D4">
+    <dgm:scene3d>
+      <a:camera prst="orthographicFront"/>
+      <a:lightRig rig="threePt" dir="t"/>
+    </dgm:scene3d>
+    <dgm:sp3d/>
+    <dgm:txPr/>
+    <dgm:style>
+      <a:lnRef idx="2">
+        <a:scrgbClr r="0" g="0" b="0"/>
+      </a:lnRef>
+      <a:fillRef idx="0">
+        <a:scrgbClr r="0" g="0" b="0"/>
+      </a:fillRef>
+      <a:effectRef idx="0">
+        <a:scrgbClr r="0" g="0" b="0"/>
+      </a:effectRef>
+      <a:fontRef idx="minor"/>
+    </dgm:style>
+  </dgm:styleLbl>
+  <dgm:styleLbl name="fgAcc1">
+    <dgm:scene3d>
+      <a:camera prst="orthographicFront"/>
+      <a:lightRig rig="threePt" dir="t"/>
+    </dgm:scene3d>
+    <dgm:sp3d/>
+    <dgm:txPr/>
+    <dgm:style>
+      <a:lnRef idx="2">
+        <a:scrgbClr r="0" g="0" b="0"/>
+      </a:lnRef>
+      <a:fillRef idx="1">
+        <a:scrgbClr r="0" g="0" b="0"/>
+      </a:fillRef>
+      <a:effectRef idx="0">
+        <a:scrgbClr r="0" g="0" b="0"/>
+      </a:effectRef>
+      <a:fontRef idx="minor"/>
+    </dgm:style>
+  </dgm:styleLbl>
+  <dgm:styleLbl name="conFgAcc1">
+    <dgm:scene3d>
+      <a:camera prst="orthographicFront"/>
+      <a:lightRig rig="threePt" dir="t"/>
+    </dgm:scene3d>
+    <dgm:sp3d/>
+    <dgm:txPr/>
+    <dgm:style>
+      <a:lnRef idx="2">
+        <a:scrgbClr r="0" g="0" b="0"/>
+      </a:lnRef>
+      <a:fillRef idx="1">
+        <a:scrgbClr r="0" g="0" b="0"/>
+      </a:fillRef>
+      <a:effectRef idx="0">
+        <a:scrgbClr r="0" g="0" b="0"/>
+      </a:effectRef>
+      <a:fontRef idx="minor"/>
+    </dgm:style>
+  </dgm:styleLbl>
+  <dgm:styleLbl name="alignAcc1">
+    <dgm:scene3d>
+      <a:camera prst="orthographicFront"/>
+      <a:lightRig rig="threePt" dir="t"/>
+    </dgm:scene3d>
+    <dgm:sp3d/>
+    <dgm:txPr/>
+    <dgm:style>
+      <a:lnRef idx="2">
+        <a:scrgbClr r="0" g="0" b="0"/>
+      </a:lnRef>
+      <a:fillRef idx="1">
+        <a:scrgbClr r="0" g="0" b="0"/>
+      </a:fillRef>
+      <a:effectRef idx="0">
+        <a:scrgbClr r="0" g="0" b="0"/>
+      </a:effectRef>
+      <a:fontRef idx="minor"/>
+    </dgm:style>
+  </dgm:styleLbl>
+  <dgm:styleLbl name="trAlignAcc1">
+    <dgm:scene3d>
+      <a:camera prst="orthographicFront"/>
+      <a:lightRig rig="threePt" dir="t"/>
+    </dgm:scene3d>
+    <dgm:sp3d/>
+    <dgm:txPr/>
+    <dgm:style>
+      <a:lnRef idx="1">
+        <a:scrgbClr r="0" g="0" b="0"/>
+      </a:lnRef>
+      <a:fillRef idx="1">
+        <a:scrgbClr r="0" g="0" b="0"/>
+      </a:fillRef>
+      <a:effectRef idx="0">
+        <a:scrgbClr r="0" g="0" b="0"/>
+      </a:effectRef>
+      <a:fontRef idx="minor"/>
+    </dgm:style>
+  </dgm:styleLbl>
+  <dgm:styleLbl name="bgAcc1">
+    <dgm:scene3d>
+      <a:camera prst="orthographicFront"/>
+      <a:lightRig rig="threePt" dir="t"/>
+    </dgm:scene3d>
+    <dgm:sp3d/>
+    <dgm:txPr/>
+    <dgm:style>
+      <a:lnRef idx="2">
+        <a:scrgbClr r="0" g="0" b="0"/>
+      </a:lnRef>
+      <a:fillRef idx="1">
+        <a:scrgbClr r="0" g="0" b="0"/>
+      </a:fillRef>
+      <a:effectRef idx="0">
+        <a:scrgbClr r="0" g="0" b="0"/>
+      </a:effectRef>
+      <a:fontRef idx="minor"/>
+    </dgm:style>
+  </dgm:styleLbl>
+  <dgm:styleLbl name="solidFgAcc1">
+    <dgm:scene3d>
+      <a:camera prst="orthographicFront"/>
+      <a:lightRig rig="threePt" dir="t"/>
+    </dgm:scene3d>
+    <dgm:sp3d/>
+    <dgm:txPr/>
+    <dgm:style>
+      <a:lnRef idx="2">
+        <a:scrgbClr r="0" g="0" b="0"/>
+      </a:lnRef>
+      <a:fillRef idx="1">
+        <a:scrgbClr r="0" g="0" b="0"/>
+      </a:fillRef>
+      <a:effectRef idx="0">
+        <a:scrgbClr r="0" g="0" b="0"/>
+      </a:effectRef>
+      <a:fontRef idx="minor"/>
+    </dgm:style>
+  </dgm:styleLbl>
+  <dgm:styleLbl name="solidAlignAcc1">
+    <dgm:scene3d>
+      <a:camera prst="orthographicFront"/>
+      <a:lightRig rig="threePt" dir="t"/>
+    </dgm:scene3d>
+    <dgm:sp3d/>
+    <dgm:txPr/>
+    <dgm:style>
+      <a:lnRef idx="2">
+        <a:scrgbClr r="0" g="0" b="0"/>
+      </a:lnRef>
+      <a:fillRef idx="1">
+        <a:scrgbClr r="0" g="0" b="0"/>
+      </a:fillRef>
+      <a:effectRef idx="0">
+        <a:scrgbClr r="0" g="0" b="0"/>
+      </a:effectRef>
+      <a:fontRef idx="minor"/>
+    </dgm:style>
+  </dgm:styleLbl>
+  <dgm:styleLbl name="solidBgAcc1">
+    <dgm:scene3d>
+      <a:camera prst="orthographicFront"/>
+      <a:lightRig rig="threePt" dir="t"/>
+    </dgm:scene3d>
+    <dgm:sp3d/>
+    <dgm:txPr/>
+    <dgm:style>
+      <a:lnRef idx="2">
+        <a:scrgbClr r="0" g="0" b="0"/>
+      </a:lnRef>
+      <a:fillRef idx="1">
+        <a:scrgbClr r="0" g="0" b="0"/>
+      </a:fillRef>
+      <a:effectRef idx="0">
+        <a:scrgbClr r="0" g="0" b="0"/>
+      </a:effectRef>
+      <a:fontRef idx="minor"/>
+    </dgm:style>
+  </dgm:styleLbl>
+  <dgm:styleLbl name="fgAccFollowNode1">
+    <dgm:scene3d>
+      <a:camera prst="orthographicFront"/>
+      <a:lightRig rig="threePt" dir="t"/>
+    </dgm:scene3d>
+    <dgm:sp3d/>
+    <dgm:txPr/>
+    <dgm:style>
+      <a:lnRef idx="2">
+        <a:scrgbClr r="0" g="0" b="0"/>
+      </a:lnRef>
+      <a:fillRef idx="1">
+        <a:scrgbClr r="0" g="0" b="0"/>
+      </a:fillRef>
+      <a:effectRef idx="0">
+        <a:scrgbClr r="0" g="0" b="0"/>
+      </a:effectRef>
+      <a:fontRef idx="minor"/>
+    </dgm:style>
+  </dgm:styleLbl>
+  <dgm:styleLbl name="alignAccFollowNode1">
+    <dgm:scene3d>
+      <a:camera prst="orthographicFront"/>
+      <a:lightRig rig="threePt" dir="t"/>
+    </dgm:scene3d>
+    <dgm:sp3d/>
+    <dgm:txPr/>
+    <dgm:style>
+      <a:lnRef idx="2">
+        <a:scrgbClr r="0" g="0" b="0"/>
+      </a:lnRef>
+      <a:fillRef idx="1">
+        <a:scrgbClr r="0" g="0" b="0"/>
+      </a:fillRef>
+      <a:effectRef idx="0">
+        <a:scrgbClr r="0" g="0" b="0"/>
+      </a:effectRef>
+      <a:fontRef idx="minor"/>
+    </dgm:style>
+  </dgm:styleLbl>
+  <dgm:styleLbl name="bgAccFollowNode1">
+    <dgm:scene3d>
+      <a:camera prst="orthographicFront"/>
+      <a:lightRig rig="threePt" dir="t"/>
+    </dgm:scene3d>
+    <dgm:sp3d/>
+    <dgm:txPr/>
+    <dgm:style>
+      <a:lnRef idx="2">
+        <a:scrgbClr r="0" g="0" b="0"/>
+      </a:lnRef>
+      <a:fillRef idx="1">
+        <a:scrgbClr r="0" g="0" b="0"/>
+      </a:fillRef>
+      <a:effectRef idx="0">
+        <a:scrgbClr r="0" g="0" b="0"/>
+      </a:effectRef>
+      <a:fontRef idx="minor"/>
+    </dgm:style>
+  </dgm:styleLbl>
+  <dgm:styleLbl name="fgAcc0">
+    <dgm:scene3d>
+      <a:camera prst="orthographicFront"/>
+      <a:lightRig rig="threePt" dir="t"/>
+    </dgm:scene3d>
+    <dgm:sp3d/>
+    <dgm:txPr/>
+    <dgm:style>
+      <a:lnRef idx="2">
+        <a:scrgbClr r="0" g="0" b="0"/>
+      </a:lnRef>
+      <a:fillRef idx="1">
+        <a:scrgbClr r="0" g="0" b="0"/>
+      </a:fillRef>
+      <a:effectRef idx="0">
+        <a:scrgbClr r="0" g="0" b="0"/>
+      </a:effectRef>
+      <a:fontRef idx="minor"/>
+    </dgm:style>
+  </dgm:styleLbl>
+  <dgm:styleLbl name="fgAcc2">
+    <dgm:scene3d>
+      <a:camera prst="orthographicFront"/>
+      <a:lightRig rig="threePt" dir="t"/>
+    </dgm:scene3d>
+    <dgm:sp3d/>
+    <dgm:txPr/>
+    <dgm:style>
+      <a:lnRef idx="2">
+        <a:scrgbClr r="0" g="0" b="0"/>
+      </a:lnRef>
+      <a:fillRef idx="1">
+        <a:scrgbClr r="0" g="0" b="0"/>
+      </a:fillRef>
+      <a:effectRef idx="0">
+        <a:scrgbClr r="0" g="0" b="0"/>
+      </a:effectRef>
+      <a:fontRef idx="minor"/>
+    </dgm:style>
+  </dgm:styleLbl>
+  <dgm:styleLbl name="fgAcc3">
+    <dgm:scene3d>
+      <a:camera prst="orthographicFront"/>
+      <a:lightRig rig="threePt" dir="t"/>
+    </dgm:scene3d>
+    <dgm:sp3d/>
+    <dgm:txPr/>
+    <dgm:style>
+      <a:lnRef idx="2">
+        <a:scrgbClr r="0" g="0" b="0"/>
+      </a:lnRef>
+      <a:fillRef idx="1">
+        <a:scrgbClr r="0" g="0" b="0"/>
+      </a:fillRef>
+      <a:effectRef idx="0">
+        <a:scrgbClr r="0" g="0" b="0"/>
+      </a:effectRef>
+      <a:fontRef idx="minor"/>
+    </dgm:style>
+  </dgm:styleLbl>
+  <dgm:styleLbl name="fgAcc4">
+    <dgm:scene3d>
+      <a:camera prst="orthographicFront"/>
+      <a:lightRig rig="threePt" dir="t"/>
+    </dgm:scene3d>
+    <dgm:sp3d/>
+    <dgm:txPr/>
+    <dgm:style>
+      <a:lnRef idx="2">
+        <a:scrgbClr r="0" g="0" b="0"/>
+      </a:lnRef>
+      <a:fillRef idx="1">
+        <a:scrgbClr r="0" g="0" b="0"/>
+      </a:fillRef>
+      <a:effectRef idx="0">
+        <a:scrgbClr r="0" g="0" b="0"/>
+      </a:effectRef>
+      <a:fontRef idx="minor"/>
+    </dgm:style>
+  </dgm:styleLbl>
+  <dgm:styleLbl name="bgShp">
+    <dgm:scene3d>
+      <a:camera prst="orthographicFront"/>
+      <a:lightRig rig="threePt" dir="t"/>
+    </dgm:scene3d>
+    <dgm:sp3d/>
+    <dgm:txPr/>
+    <dgm:style>
+      <a:lnRef idx="0">
+        <a:scrgbClr r="0" g="0" b="0"/>
+      </a:lnRef>
+      <a:fillRef idx="1">
+        <a:scrgbClr r="0" g="0" b="0"/>
+      </a:fillRef>
+      <a:effectRef idx="0">
+        <a:scrgbClr r="0" g="0" b="0"/>
+      </a:effectRef>
+      <a:fontRef idx="minor"/>
+    </dgm:style>
+  </dgm:styleLbl>
+  <dgm:styleLbl name="dkBgShp">
+    <dgm:scene3d>
+      <a:camera prst="orthographicFront"/>
+      <a:lightRig rig="threePt" dir="t"/>
+    </dgm:scene3d>
+    <dgm:sp3d/>
+    <dgm:txPr/>
+    <dgm:style>
+      <a:lnRef idx="0">
+        <a:scrgbClr r="0" g="0" b="0"/>
+      </a:lnRef>
+      <a:fillRef idx="1">
+        <a:scrgbClr r="0" g="0" b="0"/>
+      </a:fillRef>
+      <a:effectRef idx="0">
+        <a:scrgbClr r="0" g="0" b="0"/>
+      </a:effectRef>
+      <a:fontRef idx="minor"/>
+    </dgm:style>
+  </dgm:styleLbl>
+  <dgm:styleLbl name="trBgShp">
+    <dgm:scene3d>
+      <a:camera prst="orthographicFront"/>
+      <a:lightRig rig="threePt" dir="t"/>
+    </dgm:scene3d>
+    <dgm:sp3d/>
+    <dgm:txPr/>
+    <dgm:style>
+      <a:lnRef idx="0">
+        <a:scrgbClr r="0" g="0" b="0"/>
+      </a:lnRef>
+      <a:fillRef idx="1">
+        <a:scrgbClr r="0" g="0" b="0"/>
+      </a:fillRef>
+      <a:effectRef idx="0">
+        <a:scrgbClr r="0" g="0" b="0"/>
+      </a:effectRef>
+      <a:fontRef idx="minor"/>
+    </dgm:style>
+  </dgm:styleLbl>
+  <dgm:styleLbl name="fgShp">
+    <dgm:scene3d>
+      <a:camera prst="orthographicFront"/>
+      <a:lightRig rig="threePt" dir="t"/>
+    </dgm:scene3d>
+    <dgm:sp3d/>
+    <dgm:txPr/>
+    <dgm:style>
+      <a:lnRef idx="2">
+        <a:scrgbClr r="0" g="0" b="0"/>
+      </a:lnRef>
+      <a:fillRef idx="1">
+        <a:scrgbClr r="0" g="0" b="0"/>
+      </a:fillRef>
+      <a:effectRef idx="0">
+        <a:scrgbClr r="0" g="0" b="0"/>
+      </a:effectRef>
+      <a:fontRef idx="minor"/>
+    </dgm:style>
+  </dgm:styleLbl>
+  <dgm:styleLbl name="revTx">
+    <dgm:scene3d>
+      <a:camera prst="orthographicFront"/>
+      <a:lightRig rig="threePt" dir="t"/>
+    </dgm:scene3d>
+    <dgm:sp3d/>
+    <dgm:txPr/>
+    <dgm:style>
+      <a:lnRef idx="0">
+        <a:scrgbClr r="0" g="0" b="0"/>
+      </a:lnRef>
+      <a:fillRef idx="0">
+        <a:scrgbClr r="0" g="0" b="0"/>
+      </a:fillRef>
+      <a:effectRef idx="0">
+        <a:scrgbClr r="0" g="0" b="0"/>
+      </a:effectRef>
+      <a:fontRef idx="minor"/>
+    </dgm:style>
+  </dgm:styleLbl>
+</dgm:styleDef>
 </file>
 
 <file path=ppt/slideLayouts/slideLayout1.xml><?xml version="1.0" encoding="utf-8"?>
@@ -273,7 +2831,7 @@
           <a:p>
             <a:fld id="{655A5808-3B61-48CC-92EF-85AC2E0DFA56}" type="datetime2">
               <a:rPr lang="en-US" smtClean="0"/>
-              <a:t>Saturday, September 21, 2024</a:t>
+              <a:t>Sunday, September 29, 2024</a:t>
             </a:fld>
             <a:endParaRPr lang="en-US"/>
           </a:p>
@@ -471,7 +3029,7 @@
           <a:p>
             <a:fld id="{735E98AF-4574-4509-BF7A-519ACD5BF826}" type="datetime2">
               <a:rPr lang="en-US" smtClean="0"/>
-              <a:t>Saturday, September 21, 2024</a:t>
+              <a:t>Sunday, September 29, 2024</a:t>
             </a:fld>
             <a:endParaRPr lang="en-US"/>
           </a:p>
@@ -681,7 +3239,7 @@
           <a:p>
             <a:fld id="{93DD97D4-9636-490F-85D0-E926C2B6F3B1}" type="datetime2">
               <a:rPr lang="en-US" smtClean="0"/>
-              <a:t>Saturday, September 21, 2024</a:t>
+              <a:t>Sunday, September 29, 2024</a:t>
             </a:fld>
             <a:endParaRPr lang="en-US"/>
           </a:p>
@@ -880,7 +3438,7 @@
           <a:p>
             <a:fld id="{2F3AF3C6-0FD4-4939-991C-00DDE5C56815}" type="datetime2">
               <a:rPr lang="en-US" smtClean="0"/>
-              <a:t>Saturday, September 21, 2024</a:t>
+              <a:t>Sunday, September 29, 2024</a:t>
             </a:fld>
             <a:endParaRPr lang="en-US"/>
           </a:p>
@@ -1161,7 +3719,7 @@
           <a:p>
             <a:fld id="{86807482-8128-47C6-A8DD-6452B0291CFF}" type="datetime2">
               <a:rPr lang="en-US" smtClean="0"/>
-              <a:t>Saturday, September 21, 2024</a:t>
+              <a:t>Sunday, September 29, 2024</a:t>
             </a:fld>
             <a:endParaRPr lang="en-US"/>
           </a:p>
@@ -1429,7 +3987,7 @@
           <a:p>
             <a:fld id="{37903F25-275E-41DE-BE3B-EBF0DB49F9B1}" type="datetime2">
               <a:rPr lang="en-US" smtClean="0"/>
-              <a:t>Saturday, September 21, 2024</a:t>
+              <a:t>Sunday, September 29, 2024</a:t>
             </a:fld>
             <a:endParaRPr lang="en-US"/>
           </a:p>
@@ -1810,7 +4368,7 @@
           <a:p>
             <a:fld id="{EE475572-4A44-4171-84AA-64D42C8050A6}" type="datetime2">
               <a:rPr lang="en-US" smtClean="0"/>
-              <a:t>Saturday, September 21, 2024</a:t>
+              <a:t>Sunday, September 29, 2024</a:t>
             </a:fld>
             <a:endParaRPr lang="en-US"/>
           </a:p>
@@ -1980,7 +4538,7 @@
           <a:p>
             <a:fld id="{C4C1612E-528E-4FD5-9E9E-E15F1108F171}" type="datetime2">
               <a:rPr lang="en-US" smtClean="0"/>
-              <a:t>Saturday, September 21, 2024</a:t>
+              <a:t>Sunday, September 29, 2024</a:t>
             </a:fld>
             <a:endParaRPr lang="en-US"/>
           </a:p>
@@ -2093,7 +4651,7 @@
           <a:p>
             <a:fld id="{D4F6D862-A06D-436F-A92E-EBAAD50B6E50}" type="datetime2">
               <a:rPr lang="en-US" smtClean="0"/>
-              <a:t>Saturday, September 21, 2024</a:t>
+              <a:t>Sunday, September 29, 2024</a:t>
             </a:fld>
             <a:endParaRPr lang="en-US"/>
           </a:p>
@@ -2410,7 +4968,7 @@
           <a:p>
             <a:fld id="{B73E0B7D-2260-4809-8F0A-9E5F3E24F169}" type="datetime2">
               <a:rPr lang="en-US" smtClean="0"/>
-              <a:t>Saturday, September 21, 2024</a:t>
+              <a:t>Sunday, September 29, 2024</a:t>
             </a:fld>
             <a:endParaRPr lang="en-US"/>
           </a:p>
@@ -2702,7 +5260,7 @@
           <a:p>
             <a:fld id="{3C8E4735-C637-46A3-94EB-AB3AC4188D2F}" type="datetime2">
               <a:rPr lang="en-US" smtClean="0"/>
-              <a:t>Saturday, September 21, 2024</a:t>
+              <a:t>Sunday, September 29, 2024</a:t>
             </a:fld>
             <a:endParaRPr lang="en-US"/>
           </a:p>
@@ -3070,7 +5628,7 @@
             <a:fld id="{AE0C963C-C1DB-4AFD-9DDC-0691666BF49B}" type="datetime2">
               <a:rPr lang="en-US" smtClean="0"/>
               <a:pPr/>
-              <a:t>Saturday, September 21, 2024</a:t>
+              <a:t>Sunday, September 29, 2024</a:t>
             </a:fld>
             <a:endParaRPr lang="en-US" cap="all" dirty="0"/>
           </a:p>
@@ -4027,6 +6585,1251 @@
 </p:sld>
 </file>
 
+<file path=ppt/slides/slide10.xml><?xml version="1.0" encoding="utf-8"?>
+<p:sld xmlns:a="http://schemas.openxmlformats.org/drawingml/2006/main" xmlns:r="http://schemas.openxmlformats.org/officeDocument/2006/relationships" xmlns:p="http://schemas.openxmlformats.org/presentationml/2006/main">
+  <p:cSld>
+    <p:spTree>
+      <p:nvGrpSpPr>
+        <p:cNvPr id="1" name=""/>
+        <p:cNvGrpSpPr/>
+        <p:nvPr/>
+      </p:nvGrpSpPr>
+      <p:grpSpPr>
+        <a:xfrm>
+          <a:off x="0" y="0"/>
+          <a:ext cx="0" cy="0"/>
+          <a:chOff x="0" y="0"/>
+          <a:chExt cx="0" cy="0"/>
+        </a:xfrm>
+      </p:grpSpPr>
+      <p:sp>
+        <p:nvSpPr>
+          <p:cNvPr id="2" name="Título 1">
+            <a:extLst>
+              <a:ext uri="{FF2B5EF4-FFF2-40B4-BE49-F238E27FC236}">
+                <a16:creationId xmlns:a16="http://schemas.microsoft.com/office/drawing/2014/main" id="{A0FFCA12-813B-EDA4-EC64-2F085F1B3586}"/>
+              </a:ext>
+            </a:extLst>
+          </p:cNvPr>
+          <p:cNvSpPr>
+            <a:spLocks noGrp="1"/>
+          </p:cNvSpPr>
+          <p:nvPr>
+            <p:ph type="title"/>
+          </p:nvPr>
+        </p:nvSpPr>
+        <p:spPr/>
+        <p:txBody>
+          <a:bodyPr/>
+          <a:lstStyle/>
+          <a:p>
+            <a:r>
+              <a:rPr lang="pt-BR" dirty="0"/>
+              <a:t>Rascunhos Iniciais</a:t>
+            </a:r>
+          </a:p>
+        </p:txBody>
+      </p:sp>
+      <p:pic>
+        <p:nvPicPr>
+          <p:cNvPr id="7" name="Imagem 6">
+            <a:extLst>
+              <a:ext uri="{FF2B5EF4-FFF2-40B4-BE49-F238E27FC236}">
+                <a16:creationId xmlns:a16="http://schemas.microsoft.com/office/drawing/2014/main" id="{3C84D48A-5649-EAEF-6D8B-711D6D600D64}"/>
+              </a:ext>
+            </a:extLst>
+          </p:cNvPr>
+          <p:cNvPicPr>
+            <a:picLocks noChangeAspect="1"/>
+          </p:cNvPicPr>
+          <p:nvPr/>
+        </p:nvPicPr>
+        <p:blipFill>
+          <a:blip r:embed="rId2"/>
+          <a:stretch>
+            <a:fillRect/>
+          </a:stretch>
+        </p:blipFill>
+        <p:spPr>
+          <a:xfrm>
+            <a:off x="1907157" y="2395585"/>
+            <a:ext cx="7554084" cy="3424012"/>
+          </a:xfrm>
+          <a:prstGeom prst="rect">
+            <a:avLst/>
+          </a:prstGeom>
+        </p:spPr>
+      </p:pic>
+    </p:spTree>
+    <p:extLst>
+      <p:ext uri="{BB962C8B-B14F-4D97-AF65-F5344CB8AC3E}">
+        <p14:creationId xmlns:p14="http://schemas.microsoft.com/office/powerpoint/2010/main" val="2592832630"/>
+      </p:ext>
+    </p:extLst>
+  </p:cSld>
+  <p:clrMapOvr>
+    <a:masterClrMapping/>
+  </p:clrMapOvr>
+</p:sld>
+</file>
+
+<file path=ppt/slides/slide11.xml><?xml version="1.0" encoding="utf-8"?>
+<p:sld xmlns:a="http://schemas.openxmlformats.org/drawingml/2006/main" xmlns:r="http://schemas.openxmlformats.org/officeDocument/2006/relationships" xmlns:p="http://schemas.openxmlformats.org/presentationml/2006/main">
+  <p:cSld>
+    <p:bg>
+      <p:bgPr>
+        <a:solidFill>
+          <a:schemeClr val="bg1"/>
+        </a:solidFill>
+        <a:effectLst/>
+      </p:bgPr>
+    </p:bg>
+    <p:spTree>
+      <p:nvGrpSpPr>
+        <p:cNvPr id="1" name=""/>
+        <p:cNvGrpSpPr/>
+        <p:nvPr/>
+      </p:nvGrpSpPr>
+      <p:grpSpPr>
+        <a:xfrm>
+          <a:off x="0" y="0"/>
+          <a:ext cx="0" cy="0"/>
+          <a:chOff x="0" y="0"/>
+          <a:chExt cx="0" cy="0"/>
+        </a:xfrm>
+      </p:grpSpPr>
+      <p:sp useBgFill="1">
+        <p:nvSpPr>
+          <p:cNvPr id="9" name="Rectangle 8">
+            <a:extLst>
+              <a:ext uri="{FF2B5EF4-FFF2-40B4-BE49-F238E27FC236}">
+                <a16:creationId xmlns:a16="http://schemas.microsoft.com/office/drawing/2014/main" id="{E383CC5D-71E8-4CB2-8E4A-F1E4FF6DC9D6}"/>
+              </a:ext>
+              <a:ext uri="{C183D7F6-B498-43B3-948B-1728B52AA6E4}">
+                <adec:decorative xmlns:adec="http://schemas.microsoft.com/office/drawing/2017/decorative" val="1"/>
+              </a:ext>
+            </a:extLst>
+          </p:cNvPr>
+          <p:cNvSpPr>
+            <a:spLocks noGrp="1" noRot="1" noChangeAspect="1" noMove="1" noResize="1" noEditPoints="1" noAdjustHandles="1" noChangeArrowheads="1" noChangeShapeType="1" noTextEdit="1"/>
+          </p:cNvSpPr>
+          <p:nvPr>
+            <p:extLst>
+              <p:ext uri="{386F3935-93C4-4BCD-93E2-E3B085C9AB24}">
+                <p16:designElem xmlns:p16="http://schemas.microsoft.com/office/powerpoint/2015/main" val="1"/>
+              </p:ext>
+            </p:extLst>
+          </p:nvPr>
+        </p:nvSpPr>
+        <p:spPr>
+          <a:xfrm>
+            <a:off x="0" y="0"/>
+            <a:ext cx="12192000" cy="6858000"/>
+          </a:xfrm>
+          <a:prstGeom prst="rect">
+            <a:avLst/>
+          </a:prstGeom>
+          <a:ln w="12700" cap="flat" cmpd="sng" algn="ctr">
+            <a:noFill/>
+            <a:prstDash val="solid"/>
+            <a:miter lim="800000"/>
+          </a:ln>
+          <a:effectLst/>
+          <a:extLst>
+            <a:ext uri="{91240B29-F687-4F45-9708-019B960494DF}">
+              <a14:hiddenLine xmlns:a14="http://schemas.microsoft.com/office/drawing/2010/main" w="12700" cap="flat" cmpd="sng" algn="ctr">
+                <a:solidFill>
+                  <a:schemeClr val="accent1">
+                    <a:shade val="50000"/>
+                  </a:schemeClr>
+                </a:solidFill>
+                <a:prstDash val="solid"/>
+                <a:miter lim="800000"/>
+              </a14:hiddenLine>
+            </a:ext>
+          </a:extLst>
+        </p:spPr>
+        <p:style>
+          <a:lnRef idx="2">
+            <a:schemeClr val="accent1">
+              <a:shade val="50000"/>
+            </a:schemeClr>
+          </a:lnRef>
+          <a:fillRef idx="1">
+            <a:schemeClr val="accent1"/>
+          </a:fillRef>
+          <a:effectRef idx="0">
+            <a:schemeClr val="accent1"/>
+          </a:effectRef>
+          <a:fontRef idx="minor">
+            <a:schemeClr val="lt1"/>
+          </a:fontRef>
+        </p:style>
+        <p:txBody>
+          <a:bodyPr rtlCol="0" anchor="ctr"/>
+          <a:lstStyle/>
+          <a:p>
+            <a:pPr algn="ctr"/>
+            <a:endParaRPr lang="en-US"/>
+          </a:p>
+        </p:txBody>
+      </p:sp>
+      <p:sp>
+        <p:nvSpPr>
+          <p:cNvPr id="11" name="Rectangle 10">
+            <a:extLst>
+              <a:ext uri="{FF2B5EF4-FFF2-40B4-BE49-F238E27FC236}">
+                <a16:creationId xmlns:a16="http://schemas.microsoft.com/office/drawing/2014/main" id="{E2DA5AC1-43C5-4243-9028-07DBB80D0C95}"/>
+              </a:ext>
+              <a:ext uri="{C183D7F6-B498-43B3-948B-1728B52AA6E4}">
+                <adec:decorative xmlns:adec="http://schemas.microsoft.com/office/drawing/2017/decorative" val="1"/>
+              </a:ext>
+            </a:extLst>
+          </p:cNvPr>
+          <p:cNvSpPr>
+            <a:spLocks noGrp="1" noRot="1" noChangeAspect="1" noMove="1" noResize="1" noEditPoints="1" noAdjustHandles="1" noChangeArrowheads="1" noChangeShapeType="1" noTextEdit="1"/>
+          </p:cNvSpPr>
+          <p:nvPr>
+            <p:extLst>
+              <p:ext uri="{386F3935-93C4-4BCD-93E2-E3B085C9AB24}">
+                <p16:designElem xmlns:p16="http://schemas.microsoft.com/office/powerpoint/2015/main" val="1"/>
+              </p:ext>
+            </p:extLst>
+          </p:nvPr>
+        </p:nvSpPr>
+        <p:spPr>
+          <a:xfrm>
+            <a:off x="0" y="428"/>
+            <a:ext cx="12192000" cy="1600201"/>
+          </a:xfrm>
+          <a:prstGeom prst="rect">
+            <a:avLst/>
+          </a:prstGeom>
+          <a:gradFill>
+            <a:gsLst>
+              <a:gs pos="0">
+                <a:schemeClr val="accent5">
+                  <a:alpha val="83000"/>
+                </a:schemeClr>
+              </a:gs>
+              <a:gs pos="100000">
+                <a:schemeClr val="accent6"/>
+              </a:gs>
+            </a:gsLst>
+            <a:lin ang="15600000" scaled="0"/>
+          </a:gradFill>
+          <a:ln>
+            <a:noFill/>
+          </a:ln>
+        </p:spPr>
+        <p:style>
+          <a:lnRef idx="2">
+            <a:schemeClr val="accent1">
+              <a:shade val="50000"/>
+            </a:schemeClr>
+          </a:lnRef>
+          <a:fillRef idx="1">
+            <a:schemeClr val="accent1"/>
+          </a:fillRef>
+          <a:effectRef idx="0">
+            <a:schemeClr val="accent1"/>
+          </a:effectRef>
+          <a:fontRef idx="minor">
+            <a:schemeClr val="lt1"/>
+          </a:fontRef>
+        </p:style>
+        <p:txBody>
+          <a:bodyPr rtlCol="0" anchor="ctr"/>
+          <a:lstStyle/>
+          <a:p>
+            <a:pPr algn="ctr"/>
+            <a:endParaRPr lang="en-US"/>
+          </a:p>
+        </p:txBody>
+      </p:sp>
+      <p:sp>
+        <p:nvSpPr>
+          <p:cNvPr id="13" name="Rectangle 12">
+            <a:extLst>
+              <a:ext uri="{FF2B5EF4-FFF2-40B4-BE49-F238E27FC236}">
+                <a16:creationId xmlns:a16="http://schemas.microsoft.com/office/drawing/2014/main" id="{8A4EDA1C-27A1-4C83-ACE4-6675EC9245B1}"/>
+              </a:ext>
+              <a:ext uri="{C183D7F6-B498-43B3-948B-1728B52AA6E4}">
+                <adec:decorative xmlns:adec="http://schemas.microsoft.com/office/drawing/2017/decorative" val="1"/>
+              </a:ext>
+            </a:extLst>
+          </p:cNvPr>
+          <p:cNvSpPr>
+            <a:spLocks noGrp="1" noRot="1" noChangeAspect="1" noMove="1" noResize="1" noEditPoints="1" noAdjustHandles="1" noChangeArrowheads="1" noChangeShapeType="1" noTextEdit="1"/>
+          </p:cNvSpPr>
+          <p:nvPr>
+            <p:extLst>
+              <p:ext uri="{386F3935-93C4-4BCD-93E2-E3B085C9AB24}">
+                <p16:designElem xmlns:p16="http://schemas.microsoft.com/office/powerpoint/2015/main" val="1"/>
+              </p:ext>
+            </p:extLst>
+          </p:nvPr>
+        </p:nvSpPr>
+        <p:spPr>
+          <a:xfrm>
+            <a:off x="4399161" y="9109"/>
+            <a:ext cx="7792839" cy="1594270"/>
+          </a:xfrm>
+          <a:prstGeom prst="rect">
+            <a:avLst/>
+          </a:prstGeom>
+          <a:gradFill>
+            <a:gsLst>
+              <a:gs pos="22000">
+                <a:schemeClr val="accent2">
+                  <a:alpha val="0"/>
+                </a:schemeClr>
+              </a:gs>
+              <a:gs pos="99000">
+                <a:schemeClr val="accent2"/>
+              </a:gs>
+            </a:gsLst>
+            <a:lin ang="18600000" scaled="0"/>
+          </a:gradFill>
+          <a:ln>
+            <a:noFill/>
+          </a:ln>
+        </p:spPr>
+        <p:style>
+          <a:lnRef idx="2">
+            <a:schemeClr val="accent1">
+              <a:shade val="50000"/>
+            </a:schemeClr>
+          </a:lnRef>
+          <a:fillRef idx="1">
+            <a:schemeClr val="accent1"/>
+          </a:fillRef>
+          <a:effectRef idx="0">
+            <a:schemeClr val="accent1"/>
+          </a:effectRef>
+          <a:fontRef idx="minor">
+            <a:schemeClr val="lt1"/>
+          </a:fontRef>
+        </p:style>
+        <p:txBody>
+          <a:bodyPr rtlCol="0" anchor="ctr"/>
+          <a:lstStyle/>
+          <a:p>
+            <a:pPr algn="ctr"/>
+            <a:endParaRPr lang="en-US" dirty="0"/>
+          </a:p>
+        </p:txBody>
+      </p:sp>
+      <p:sp>
+        <p:nvSpPr>
+          <p:cNvPr id="15" name="Rectangle 14">
+            <a:extLst>
+              <a:ext uri="{FF2B5EF4-FFF2-40B4-BE49-F238E27FC236}">
+                <a16:creationId xmlns:a16="http://schemas.microsoft.com/office/drawing/2014/main" id="{1C2185E4-B584-4B9D-9440-DEA0FB9D94DF}"/>
+              </a:ext>
+              <a:ext uri="{C183D7F6-B498-43B3-948B-1728B52AA6E4}">
+                <adec:decorative xmlns:adec="http://schemas.microsoft.com/office/drawing/2017/decorative" val="1"/>
+              </a:ext>
+            </a:extLst>
+          </p:cNvPr>
+          <p:cNvSpPr>
+            <a:spLocks noGrp="1" noRot="1" noChangeAspect="1" noMove="1" noResize="1" noEditPoints="1" noAdjustHandles="1" noChangeArrowheads="1" noChangeShapeType="1" noTextEdit="1"/>
+          </p:cNvSpPr>
+          <p:nvPr>
+            <p:extLst>
+              <p:ext uri="{386F3935-93C4-4BCD-93E2-E3B085C9AB24}">
+                <p16:designElem xmlns:p16="http://schemas.microsoft.com/office/powerpoint/2015/main" val="1"/>
+              </p:ext>
+            </p:extLst>
+          </p:nvPr>
+        </p:nvSpPr>
+        <p:spPr>
+          <a:xfrm rot="16200000">
+            <a:off x="9021976" y="-906246"/>
+            <a:ext cx="1602951" cy="3416298"/>
+          </a:xfrm>
+          <a:prstGeom prst="rect">
+            <a:avLst/>
+          </a:prstGeom>
+          <a:gradFill>
+            <a:gsLst>
+              <a:gs pos="45000">
+                <a:schemeClr val="accent4">
+                  <a:alpha val="0"/>
+                </a:schemeClr>
+              </a:gs>
+              <a:gs pos="99000">
+                <a:schemeClr val="accent6">
+                  <a:alpha val="33000"/>
+                </a:schemeClr>
+              </a:gs>
+            </a:gsLst>
+            <a:lin ang="15000000" scaled="0"/>
+          </a:gradFill>
+          <a:ln>
+            <a:noFill/>
+          </a:ln>
+        </p:spPr>
+        <p:style>
+          <a:lnRef idx="2">
+            <a:schemeClr val="accent1">
+              <a:shade val="50000"/>
+            </a:schemeClr>
+          </a:lnRef>
+          <a:fillRef idx="1">
+            <a:schemeClr val="accent1"/>
+          </a:fillRef>
+          <a:effectRef idx="0">
+            <a:schemeClr val="accent1"/>
+          </a:effectRef>
+          <a:fontRef idx="minor">
+            <a:schemeClr val="lt1"/>
+          </a:fontRef>
+        </p:style>
+        <p:txBody>
+          <a:bodyPr rtlCol="0" anchor="ctr"/>
+          <a:lstStyle/>
+          <a:p>
+            <a:pPr algn="ctr"/>
+            <a:endParaRPr lang="en-US" dirty="0"/>
+          </a:p>
+        </p:txBody>
+      </p:sp>
+      <p:sp>
+        <p:nvSpPr>
+          <p:cNvPr id="17" name="Rectangle 16">
+            <a:extLst>
+              <a:ext uri="{FF2B5EF4-FFF2-40B4-BE49-F238E27FC236}">
+                <a16:creationId xmlns:a16="http://schemas.microsoft.com/office/drawing/2014/main" id="{FF33EC8A-EE0A-4395-97E2-DAD467CF734C}"/>
+              </a:ext>
+              <a:ext uri="{C183D7F6-B498-43B3-948B-1728B52AA6E4}">
+                <adec:decorative xmlns:adec="http://schemas.microsoft.com/office/drawing/2017/decorative" val="1"/>
+              </a:ext>
+            </a:extLst>
+          </p:cNvPr>
+          <p:cNvSpPr>
+            <a:spLocks noGrp="1" noRot="1" noChangeAspect="1" noMove="1" noResize="1" noEditPoints="1" noAdjustHandles="1" noChangeArrowheads="1" noChangeShapeType="1" noTextEdit="1"/>
+          </p:cNvSpPr>
+          <p:nvPr>
+            <p:extLst>
+              <p:ext uri="{386F3935-93C4-4BCD-93E2-E3B085C9AB24}">
+                <p16:designElem xmlns:p16="http://schemas.microsoft.com/office/powerpoint/2015/main" val="1"/>
+              </p:ext>
+            </p:extLst>
+          </p:nvPr>
+        </p:nvSpPr>
+        <p:spPr>
+          <a:xfrm rot="10800000">
+            <a:off x="2451242" y="0"/>
+            <a:ext cx="9729549" cy="1600198"/>
+          </a:xfrm>
+          <a:prstGeom prst="rect">
+            <a:avLst/>
+          </a:prstGeom>
+          <a:gradFill>
+            <a:gsLst>
+              <a:gs pos="0">
+                <a:schemeClr val="accent5">
+                  <a:alpha val="30000"/>
+                </a:schemeClr>
+              </a:gs>
+              <a:gs pos="99000">
+                <a:schemeClr val="accent5">
+                  <a:alpha val="0"/>
+                </a:schemeClr>
+              </a:gs>
+            </a:gsLst>
+            <a:lin ang="19800000" scaled="0"/>
+          </a:gradFill>
+          <a:ln>
+            <a:noFill/>
+          </a:ln>
+        </p:spPr>
+        <p:style>
+          <a:lnRef idx="2">
+            <a:schemeClr val="accent1">
+              <a:shade val="50000"/>
+            </a:schemeClr>
+          </a:lnRef>
+          <a:fillRef idx="1">
+            <a:schemeClr val="accent1"/>
+          </a:fillRef>
+          <a:effectRef idx="0">
+            <a:schemeClr val="accent1"/>
+          </a:effectRef>
+          <a:fontRef idx="minor">
+            <a:schemeClr val="lt1"/>
+          </a:fontRef>
+        </p:style>
+        <p:txBody>
+          <a:bodyPr rtlCol="0" anchor="ctr"/>
+          <a:lstStyle/>
+          <a:p>
+            <a:pPr algn="ctr"/>
+            <a:endParaRPr lang="en-US"/>
+          </a:p>
+        </p:txBody>
+      </p:sp>
+      <p:sp>
+        <p:nvSpPr>
+          <p:cNvPr id="19" name="Rectangle 18">
+            <a:extLst>
+              <a:ext uri="{FF2B5EF4-FFF2-40B4-BE49-F238E27FC236}">
+                <a16:creationId xmlns:a16="http://schemas.microsoft.com/office/drawing/2014/main" id="{FF85DA95-16A4-404E-9BFF-27F8E4FC78AA}"/>
+              </a:ext>
+              <a:ext uri="{C183D7F6-B498-43B3-948B-1728B52AA6E4}">
+                <adec:decorative xmlns:adec="http://schemas.microsoft.com/office/drawing/2017/decorative" val="1"/>
+              </a:ext>
+            </a:extLst>
+          </p:cNvPr>
+          <p:cNvSpPr>
+            <a:spLocks noGrp="1" noRot="1" noChangeAspect="1" noMove="1" noResize="1" noEditPoints="1" noAdjustHandles="1" noChangeArrowheads="1" noChangeShapeType="1" noTextEdit="1"/>
+          </p:cNvSpPr>
+          <p:nvPr>
+            <p:extLst>
+              <p:ext uri="{386F3935-93C4-4BCD-93E2-E3B085C9AB24}">
+                <p16:designElem xmlns:p16="http://schemas.microsoft.com/office/powerpoint/2015/main" val="1"/>
+              </p:ext>
+            </p:extLst>
+          </p:nvPr>
+        </p:nvSpPr>
+        <p:spPr>
+          <a:xfrm>
+            <a:off x="-2" y="430"/>
+            <a:ext cx="7910111" cy="1600198"/>
+          </a:xfrm>
+          <a:prstGeom prst="rect">
+            <a:avLst/>
+          </a:prstGeom>
+          <a:gradFill>
+            <a:gsLst>
+              <a:gs pos="0">
+                <a:schemeClr val="accent5">
+                  <a:alpha val="21000"/>
+                </a:schemeClr>
+              </a:gs>
+              <a:gs pos="99000">
+                <a:schemeClr val="accent5">
+                  <a:alpha val="0"/>
+                </a:schemeClr>
+              </a:gs>
+            </a:gsLst>
+            <a:lin ang="20400000" scaled="0"/>
+          </a:gradFill>
+          <a:ln>
+            <a:noFill/>
+          </a:ln>
+        </p:spPr>
+        <p:style>
+          <a:lnRef idx="2">
+            <a:schemeClr val="accent1">
+              <a:shade val="50000"/>
+            </a:schemeClr>
+          </a:lnRef>
+          <a:fillRef idx="1">
+            <a:schemeClr val="accent1"/>
+          </a:fillRef>
+          <a:effectRef idx="0">
+            <a:schemeClr val="accent1"/>
+          </a:effectRef>
+          <a:fontRef idx="minor">
+            <a:schemeClr val="lt1"/>
+          </a:fontRef>
+        </p:style>
+        <p:txBody>
+          <a:bodyPr rtlCol="0" anchor="ctr"/>
+          <a:lstStyle/>
+          <a:p>
+            <a:pPr algn="ctr"/>
+            <a:endParaRPr lang="en-US"/>
+          </a:p>
+        </p:txBody>
+      </p:sp>
+      <p:sp>
+        <p:nvSpPr>
+          <p:cNvPr id="2" name="Título 1">
+            <a:extLst>
+              <a:ext uri="{FF2B5EF4-FFF2-40B4-BE49-F238E27FC236}">
+                <a16:creationId xmlns:a16="http://schemas.microsoft.com/office/drawing/2014/main" id="{2D3CD02A-55DB-4BEC-982B-6BC479725D11}"/>
+              </a:ext>
+            </a:extLst>
+          </p:cNvPr>
+          <p:cNvSpPr>
+            <a:spLocks noGrp="1"/>
+          </p:cNvSpPr>
+          <p:nvPr>
+            <p:ph type="title"/>
+          </p:nvPr>
+        </p:nvSpPr>
+        <p:spPr>
+          <a:xfrm>
+            <a:off x="1157084" y="374427"/>
+            <a:ext cx="10374517" cy="971512"/>
+          </a:xfrm>
+        </p:spPr>
+        <p:txBody>
+          <a:bodyPr anchor="ctr">
+            <a:normAutofit/>
+          </a:bodyPr>
+          <a:lstStyle/>
+          <a:p>
+            <a:r>
+              <a:rPr lang="pt-BR" sz="3200">
+                <a:solidFill>
+                  <a:schemeClr val="bg1"/>
+                </a:solidFill>
+              </a:rPr>
+              <a:t>Conclusão</a:t>
+            </a:r>
+          </a:p>
+        </p:txBody>
+      </p:sp>
+      <p:graphicFrame>
+        <p:nvGraphicFramePr>
+          <p:cNvPr id="5" name="Espaço Reservado para Conteúdo 2">
+            <a:extLst>
+              <a:ext uri="{FF2B5EF4-FFF2-40B4-BE49-F238E27FC236}">
+                <a16:creationId xmlns:a16="http://schemas.microsoft.com/office/drawing/2014/main" id="{1B6AEF99-DCDD-EC27-98FA-F8F0815DECF7}"/>
+              </a:ext>
+            </a:extLst>
+          </p:cNvPr>
+          <p:cNvGraphicFramePr>
+            <a:graphicFrameLocks noGrp="1"/>
+          </p:cNvGraphicFramePr>
+          <p:nvPr>
+            <p:ph idx="1"/>
+            <p:extLst>
+              <p:ext uri="{D42A27DB-BD31-4B8C-83A1-F6EECF244321}">
+                <p14:modId xmlns:p14="http://schemas.microsoft.com/office/powerpoint/2010/main" val="1086627134"/>
+              </p:ext>
+            </p:extLst>
+          </p:nvPr>
+        </p:nvGraphicFramePr>
+        <p:xfrm>
+          <a:off x="579474" y="2062715"/>
+          <a:ext cx="11033029" cy="4189229"/>
+        </p:xfrm>
+        <a:graphic>
+          <a:graphicData uri="http://schemas.openxmlformats.org/drawingml/2006/diagram">
+            <dgm:relIds xmlns:dgm="http://schemas.openxmlformats.org/drawingml/2006/diagram" xmlns:r="http://schemas.openxmlformats.org/officeDocument/2006/relationships" r:dm="rId2" r:lo="rId3" r:qs="rId4" r:cs="rId5"/>
+          </a:graphicData>
+        </a:graphic>
+      </p:graphicFrame>
+    </p:spTree>
+    <p:extLst>
+      <p:ext uri="{BB962C8B-B14F-4D97-AF65-F5344CB8AC3E}">
+        <p14:creationId xmlns:p14="http://schemas.microsoft.com/office/powerpoint/2010/main" val="800741475"/>
+      </p:ext>
+    </p:extLst>
+  </p:cSld>
+  <p:clrMapOvr>
+    <a:masterClrMapping/>
+  </p:clrMapOvr>
+</p:sld>
+</file>
+
+<file path=ppt/slides/slide12.xml><?xml version="1.0" encoding="utf-8"?>
+<p:sld xmlns:a="http://schemas.openxmlformats.org/drawingml/2006/main" xmlns:r="http://schemas.openxmlformats.org/officeDocument/2006/relationships" xmlns:p="http://schemas.openxmlformats.org/presentationml/2006/main">
+  <p:cSld>
+    <p:bg>
+      <p:bgPr>
+        <a:solidFill>
+          <a:schemeClr val="bg1"/>
+        </a:solidFill>
+        <a:effectLst/>
+      </p:bgPr>
+    </p:bg>
+    <p:spTree>
+      <p:nvGrpSpPr>
+        <p:cNvPr id="1" name=""/>
+        <p:cNvGrpSpPr/>
+        <p:nvPr/>
+      </p:nvGrpSpPr>
+      <p:grpSpPr>
+        <a:xfrm>
+          <a:off x="0" y="0"/>
+          <a:ext cx="0" cy="0"/>
+          <a:chOff x="0" y="0"/>
+          <a:chExt cx="0" cy="0"/>
+        </a:xfrm>
+      </p:grpSpPr>
+      <p:sp>
+        <p:nvSpPr>
+          <p:cNvPr id="7" name="Rectangle 6">
+            <a:extLst>
+              <a:ext uri="{FF2B5EF4-FFF2-40B4-BE49-F238E27FC236}">
+                <a16:creationId xmlns:a16="http://schemas.microsoft.com/office/drawing/2014/main" id="{BD4C0BBB-0042-4603-A226-6117F3FD5B3C}"/>
+              </a:ext>
+              <a:ext uri="{C183D7F6-B498-43B3-948B-1728B52AA6E4}">
+                <adec:decorative xmlns:adec="http://schemas.microsoft.com/office/drawing/2017/decorative" val="1"/>
+              </a:ext>
+            </a:extLst>
+          </p:cNvPr>
+          <p:cNvSpPr>
+            <a:spLocks noGrp="1" noRot="1" noChangeAspect="1" noMove="1" noResize="1" noEditPoints="1" noAdjustHandles="1" noChangeArrowheads="1" noChangeShapeType="1" noTextEdit="1"/>
+          </p:cNvSpPr>
+          <p:nvPr>
+            <p:extLst>
+              <p:ext uri="{386F3935-93C4-4BCD-93E2-E3B085C9AB24}">
+                <p16:designElem xmlns:p16="http://schemas.microsoft.com/office/powerpoint/2015/main" val="1"/>
+              </p:ext>
+            </p:extLst>
+          </p:nvPr>
+        </p:nvSpPr>
+        <p:spPr>
+          <a:xfrm rot="10800000" flipH="1">
+            <a:off x="0" y="6400799"/>
+            <a:ext cx="12192000" cy="456773"/>
+          </a:xfrm>
+          <a:prstGeom prst="rect">
+            <a:avLst/>
+          </a:prstGeom>
+          <a:gradFill>
+            <a:gsLst>
+              <a:gs pos="14000">
+                <a:schemeClr val="accent4">
+                  <a:alpha val="28000"/>
+                </a:schemeClr>
+              </a:gs>
+              <a:gs pos="100000">
+                <a:schemeClr val="accent5">
+                  <a:alpha val="85000"/>
+                </a:schemeClr>
+              </a:gs>
+            </a:gsLst>
+            <a:lin ang="6000000" scaled="0"/>
+          </a:gradFill>
+          <a:ln>
+            <a:noFill/>
+          </a:ln>
+        </p:spPr>
+        <p:style>
+          <a:lnRef idx="2">
+            <a:schemeClr val="accent1">
+              <a:shade val="50000"/>
+            </a:schemeClr>
+          </a:lnRef>
+          <a:fillRef idx="1">
+            <a:schemeClr val="accent1"/>
+          </a:fillRef>
+          <a:effectRef idx="0">
+            <a:schemeClr val="accent1"/>
+          </a:effectRef>
+          <a:fontRef idx="minor">
+            <a:schemeClr val="lt1"/>
+          </a:fontRef>
+        </p:style>
+        <p:txBody>
+          <a:bodyPr rtlCol="0" anchor="ctr"/>
+          <a:lstStyle/>
+          <a:p>
+            <a:pPr algn="ctr"/>
+            <a:endParaRPr lang="en-US"/>
+          </a:p>
+        </p:txBody>
+      </p:sp>
+      <p:sp>
+        <p:nvSpPr>
+          <p:cNvPr id="9" name="Rectangle 8">
+            <a:extLst>
+              <a:ext uri="{FF2B5EF4-FFF2-40B4-BE49-F238E27FC236}">
+                <a16:creationId xmlns:a16="http://schemas.microsoft.com/office/drawing/2014/main" id="{EC44F520-2598-460E-9F91-B02F60830CA2}"/>
+              </a:ext>
+              <a:ext uri="{C183D7F6-B498-43B3-948B-1728B52AA6E4}">
+                <adec:decorative xmlns:adec="http://schemas.microsoft.com/office/drawing/2017/decorative" val="1"/>
+              </a:ext>
+            </a:extLst>
+          </p:cNvPr>
+          <p:cNvSpPr>
+            <a:spLocks noGrp="1" noRot="1" noChangeAspect="1" noMove="1" noResize="1" noEditPoints="1" noAdjustHandles="1" noChangeArrowheads="1" noChangeShapeType="1" noTextEdit="1"/>
+          </p:cNvSpPr>
+          <p:nvPr>
+            <p:extLst>
+              <p:ext uri="{386F3935-93C4-4BCD-93E2-E3B085C9AB24}">
+                <p16:designElem xmlns:p16="http://schemas.microsoft.com/office/powerpoint/2015/main" val="1"/>
+              </p:ext>
+            </p:extLst>
+          </p:nvPr>
+        </p:nvSpPr>
+        <p:spPr>
+          <a:xfrm flipH="1">
+            <a:off x="4038600" y="6400799"/>
+            <a:ext cx="8153398" cy="456772"/>
+          </a:xfrm>
+          <a:prstGeom prst="rect">
+            <a:avLst/>
+          </a:prstGeom>
+          <a:gradFill>
+            <a:gsLst>
+              <a:gs pos="9000">
+                <a:schemeClr val="accent2">
+                  <a:lumMod val="60000"/>
+                  <a:lumOff val="40000"/>
+                  <a:alpha val="55000"/>
+                </a:schemeClr>
+              </a:gs>
+              <a:gs pos="99000">
+                <a:schemeClr val="accent2"/>
+              </a:gs>
+            </a:gsLst>
+            <a:lin ang="14400000" scaled="0"/>
+          </a:gradFill>
+          <a:ln>
+            <a:noFill/>
+          </a:ln>
+        </p:spPr>
+        <p:style>
+          <a:lnRef idx="2">
+            <a:schemeClr val="accent1">
+              <a:shade val="50000"/>
+            </a:schemeClr>
+          </a:lnRef>
+          <a:fillRef idx="1">
+            <a:schemeClr val="accent1"/>
+          </a:fillRef>
+          <a:effectRef idx="0">
+            <a:schemeClr val="accent1"/>
+          </a:effectRef>
+          <a:fontRef idx="minor">
+            <a:schemeClr val="lt1"/>
+          </a:fontRef>
+        </p:style>
+        <p:txBody>
+          <a:bodyPr rtlCol="0" anchor="ctr"/>
+          <a:lstStyle/>
+          <a:p>
+            <a:pPr algn="ctr"/>
+            <a:endParaRPr lang="en-US"/>
+          </a:p>
+        </p:txBody>
+      </p:sp>
+      <p:sp useBgFill="1">
+        <p:nvSpPr>
+          <p:cNvPr id="11" name="Rectangle 10">
+            <a:extLst>
+              <a:ext uri="{FF2B5EF4-FFF2-40B4-BE49-F238E27FC236}">
+                <a16:creationId xmlns:a16="http://schemas.microsoft.com/office/drawing/2014/main" id="{2F23DF24-8E9A-4AD0-93DF-A82A41666725}"/>
+              </a:ext>
+              <a:ext uri="{C183D7F6-B498-43B3-948B-1728B52AA6E4}">
+                <adec:decorative xmlns:adec="http://schemas.microsoft.com/office/drawing/2017/decorative" val="1"/>
+              </a:ext>
+            </a:extLst>
+          </p:cNvPr>
+          <p:cNvSpPr>
+            <a:spLocks noGrp="1" noRot="1" noChangeAspect="1" noMove="1" noResize="1" noEditPoints="1" noAdjustHandles="1" noChangeArrowheads="1" noChangeShapeType="1" noTextEdit="1"/>
+          </p:cNvSpPr>
+          <p:nvPr>
+            <p:extLst>
+              <p:ext uri="{386F3935-93C4-4BCD-93E2-E3B085C9AB24}">
+                <p16:designElem xmlns:p16="http://schemas.microsoft.com/office/powerpoint/2015/main" val="1"/>
+              </p:ext>
+            </p:extLst>
+          </p:nvPr>
+        </p:nvSpPr>
+        <p:spPr>
+          <a:xfrm>
+            <a:off x="0" y="0"/>
+            <a:ext cx="12192000" cy="6858000"/>
+          </a:xfrm>
+          <a:prstGeom prst="rect">
+            <a:avLst/>
+          </a:prstGeom>
+          <a:ln w="12700" cap="flat" cmpd="sng" algn="ctr">
+            <a:noFill/>
+            <a:prstDash val="solid"/>
+            <a:miter lim="800000"/>
+          </a:ln>
+          <a:effectLst/>
+          <a:extLst>
+            <a:ext uri="{91240B29-F687-4F45-9708-019B960494DF}">
+              <a14:hiddenLine xmlns:a14="http://schemas.microsoft.com/office/drawing/2010/main" w="12700" cap="flat" cmpd="sng" algn="ctr">
+                <a:solidFill>
+                  <a:schemeClr val="accent1">
+                    <a:shade val="50000"/>
+                  </a:schemeClr>
+                </a:solidFill>
+                <a:prstDash val="solid"/>
+                <a:miter lim="800000"/>
+              </a14:hiddenLine>
+            </a:ext>
+          </a:extLst>
+        </p:spPr>
+        <p:style>
+          <a:lnRef idx="2">
+            <a:schemeClr val="accent1">
+              <a:shade val="50000"/>
+            </a:schemeClr>
+          </a:lnRef>
+          <a:fillRef idx="1">
+            <a:schemeClr val="accent1"/>
+          </a:fillRef>
+          <a:effectRef idx="0">
+            <a:schemeClr val="accent1"/>
+          </a:effectRef>
+          <a:fontRef idx="minor">
+            <a:schemeClr val="lt1"/>
+          </a:fontRef>
+        </p:style>
+        <p:txBody>
+          <a:bodyPr rtlCol="0" anchor="ctr"/>
+          <a:lstStyle/>
+          <a:p>
+            <a:pPr algn="ctr"/>
+            <a:endParaRPr lang="en-US"/>
+          </a:p>
+        </p:txBody>
+      </p:sp>
+      <p:sp>
+        <p:nvSpPr>
+          <p:cNvPr id="2" name="Título 1">
+            <a:extLst>
+              <a:ext uri="{FF2B5EF4-FFF2-40B4-BE49-F238E27FC236}">
+                <a16:creationId xmlns:a16="http://schemas.microsoft.com/office/drawing/2014/main" id="{FA14C450-71FA-B380-742A-72B83598B0C9}"/>
+              </a:ext>
+            </a:extLst>
+          </p:cNvPr>
+          <p:cNvSpPr>
+            <a:spLocks noGrp="1"/>
+          </p:cNvSpPr>
+          <p:nvPr>
+            <p:ph type="title"/>
+          </p:nvPr>
+        </p:nvSpPr>
+        <p:spPr>
+          <a:xfrm>
+            <a:off x="6633768" y="3968153"/>
+            <a:ext cx="4978735" cy="1995326"/>
+          </a:xfrm>
+        </p:spPr>
+        <p:txBody>
+          <a:bodyPr vert="horz" lIns="0" tIns="0" rIns="0" bIns="0" rtlCol="0" anchor="b">
+            <a:normAutofit/>
+          </a:bodyPr>
+          <a:lstStyle/>
+          <a:p>
+            <a:pPr algn="r"/>
+            <a:r>
+              <a:rPr lang="en-US" spc="750"/>
+              <a:t>Obrigado!</a:t>
+            </a:r>
+          </a:p>
+        </p:txBody>
+      </p:sp>
+      <p:sp>
+        <p:nvSpPr>
+          <p:cNvPr id="13" name="Rectangle 12">
+            <a:extLst>
+              <a:ext uri="{FF2B5EF4-FFF2-40B4-BE49-F238E27FC236}">
+                <a16:creationId xmlns:a16="http://schemas.microsoft.com/office/drawing/2014/main" id="{E728B9D0-05A6-4333-BB22-46585AA7706F}"/>
+              </a:ext>
+              <a:ext uri="{C183D7F6-B498-43B3-948B-1728B52AA6E4}">
+                <adec:decorative xmlns:adec="http://schemas.microsoft.com/office/drawing/2017/decorative" val="1"/>
+              </a:ext>
+            </a:extLst>
+          </p:cNvPr>
+          <p:cNvSpPr>
+            <a:spLocks noGrp="1" noRot="1" noChangeAspect="1" noMove="1" noResize="1" noEditPoints="1" noAdjustHandles="1" noChangeArrowheads="1" noChangeShapeType="1" noTextEdit="1"/>
+          </p:cNvSpPr>
+          <p:nvPr>
+            <p:extLst>
+              <p:ext uri="{386F3935-93C4-4BCD-93E2-E3B085C9AB24}">
+                <p16:designElem xmlns:p16="http://schemas.microsoft.com/office/powerpoint/2015/main" val="1"/>
+              </p:ext>
+            </p:extLst>
+          </p:nvPr>
+        </p:nvSpPr>
+        <p:spPr>
+          <a:xfrm flipH="1">
+            <a:off x="-2" y="0"/>
+            <a:ext cx="6096000" cy="6858000"/>
+          </a:xfrm>
+          <a:prstGeom prst="rect">
+            <a:avLst/>
+          </a:prstGeom>
+          <a:gradFill>
+            <a:gsLst>
+              <a:gs pos="8000">
+                <a:schemeClr val="accent6"/>
+              </a:gs>
+              <a:gs pos="100000">
+                <a:schemeClr val="accent5">
+                  <a:alpha val="89000"/>
+                </a:schemeClr>
+              </a:gs>
+            </a:gsLst>
+            <a:lin ang="2400000" scaled="0"/>
+          </a:gradFill>
+          <a:ln>
+            <a:noFill/>
+          </a:ln>
+        </p:spPr>
+        <p:style>
+          <a:lnRef idx="2">
+            <a:schemeClr val="accent1">
+              <a:shade val="50000"/>
+            </a:schemeClr>
+          </a:lnRef>
+          <a:fillRef idx="1">
+            <a:schemeClr val="accent1"/>
+          </a:fillRef>
+          <a:effectRef idx="0">
+            <a:schemeClr val="accent1"/>
+          </a:effectRef>
+          <a:fontRef idx="minor">
+            <a:schemeClr val="lt1"/>
+          </a:fontRef>
+        </p:style>
+        <p:txBody>
+          <a:bodyPr rtlCol="0" anchor="ctr"/>
+          <a:lstStyle/>
+          <a:p>
+            <a:pPr algn="ctr"/>
+            <a:endParaRPr lang="en-US"/>
+          </a:p>
+        </p:txBody>
+      </p:sp>
+      <p:sp>
+        <p:nvSpPr>
+          <p:cNvPr id="15" name="Rectangle 14">
+            <a:extLst>
+              <a:ext uri="{FF2B5EF4-FFF2-40B4-BE49-F238E27FC236}">
+                <a16:creationId xmlns:a16="http://schemas.microsoft.com/office/drawing/2014/main" id="{E2BACE5B-B094-444A-A9B3-E31F591F377F}"/>
+              </a:ext>
+              <a:ext uri="{C183D7F6-B498-43B3-948B-1728B52AA6E4}">
+                <adec:decorative xmlns:adec="http://schemas.microsoft.com/office/drawing/2017/decorative" val="1"/>
+              </a:ext>
+            </a:extLst>
+          </p:cNvPr>
+          <p:cNvSpPr>
+            <a:spLocks noGrp="1" noRot="1" noChangeAspect="1" noMove="1" noResize="1" noEditPoints="1" noAdjustHandles="1" noChangeArrowheads="1" noChangeShapeType="1" noTextEdit="1"/>
+          </p:cNvSpPr>
+          <p:nvPr>
+            <p:extLst>
+              <p:ext uri="{386F3935-93C4-4BCD-93E2-E3B085C9AB24}">
+                <p16:designElem xmlns:p16="http://schemas.microsoft.com/office/powerpoint/2015/main" val="1"/>
+              </p:ext>
+            </p:extLst>
+          </p:nvPr>
+        </p:nvSpPr>
+        <p:spPr>
+          <a:xfrm flipH="1">
+            <a:off x="0" y="17416"/>
+            <a:ext cx="4038600" cy="6840156"/>
+          </a:xfrm>
+          <a:prstGeom prst="rect">
+            <a:avLst/>
+          </a:prstGeom>
+          <a:gradFill>
+            <a:gsLst>
+              <a:gs pos="22000">
+                <a:schemeClr val="accent5">
+                  <a:lumMod val="60000"/>
+                  <a:lumOff val="40000"/>
+                  <a:alpha val="0"/>
+                </a:schemeClr>
+              </a:gs>
+              <a:gs pos="99000">
+                <a:schemeClr val="accent2">
+                  <a:alpha val="92000"/>
+                </a:schemeClr>
+              </a:gs>
+            </a:gsLst>
+            <a:lin ang="4200000" scaled="0"/>
+          </a:gradFill>
+          <a:ln>
+            <a:noFill/>
+          </a:ln>
+        </p:spPr>
+        <p:style>
+          <a:lnRef idx="2">
+            <a:schemeClr val="accent1">
+              <a:shade val="50000"/>
+            </a:schemeClr>
+          </a:lnRef>
+          <a:fillRef idx="1">
+            <a:schemeClr val="accent1"/>
+          </a:fillRef>
+          <a:effectRef idx="0">
+            <a:schemeClr val="accent1"/>
+          </a:effectRef>
+          <a:fontRef idx="minor">
+            <a:schemeClr val="lt1"/>
+          </a:fontRef>
+        </p:style>
+        <p:txBody>
+          <a:bodyPr rtlCol="0" anchor="ctr"/>
+          <a:lstStyle/>
+          <a:p>
+            <a:pPr algn="ctr"/>
+            <a:endParaRPr lang="en-US"/>
+          </a:p>
+        </p:txBody>
+      </p:sp>
+      <p:sp>
+        <p:nvSpPr>
+          <p:cNvPr id="17" name="Rectangle 16">
+            <a:extLst>
+              <a:ext uri="{FF2B5EF4-FFF2-40B4-BE49-F238E27FC236}">
+                <a16:creationId xmlns:a16="http://schemas.microsoft.com/office/drawing/2014/main" id="{AF8B47F9-648C-4086-8D7A-EA234E2EE800}"/>
+              </a:ext>
+              <a:ext uri="{C183D7F6-B498-43B3-948B-1728B52AA6E4}">
+                <adec:decorative xmlns:adec="http://schemas.microsoft.com/office/drawing/2017/decorative" val="1"/>
+              </a:ext>
+            </a:extLst>
+          </p:cNvPr>
+          <p:cNvSpPr>
+            <a:spLocks noGrp="1" noRot="1" noChangeAspect="1" noMove="1" noResize="1" noEditPoints="1" noAdjustHandles="1" noChangeArrowheads="1" noChangeShapeType="1" noTextEdit="1"/>
+          </p:cNvSpPr>
+          <p:nvPr>
+            <p:extLst>
+              <p:ext uri="{386F3935-93C4-4BCD-93E2-E3B085C9AB24}">
+                <p16:designElem xmlns:p16="http://schemas.microsoft.com/office/powerpoint/2015/main" val="1"/>
+              </p:ext>
+            </p:extLst>
+          </p:nvPr>
+        </p:nvSpPr>
+        <p:spPr>
+          <a:xfrm rot="5400000" flipH="1">
+            <a:off x="-129604" y="614984"/>
+            <a:ext cx="6812404" cy="5638799"/>
+          </a:xfrm>
+          <a:prstGeom prst="rect">
+            <a:avLst/>
+          </a:prstGeom>
+          <a:gradFill>
+            <a:gsLst>
+              <a:gs pos="2000">
+                <a:schemeClr val="accent5">
+                  <a:alpha val="19000"/>
+                </a:schemeClr>
+              </a:gs>
+              <a:gs pos="100000">
+                <a:schemeClr val="accent4">
+                  <a:alpha val="0"/>
+                </a:schemeClr>
+              </a:gs>
+            </a:gsLst>
+            <a:lin ang="21594000" scaled="0"/>
+          </a:gradFill>
+          <a:ln>
+            <a:noFill/>
+          </a:ln>
+        </p:spPr>
+        <p:style>
+          <a:lnRef idx="2">
+            <a:schemeClr val="accent1">
+              <a:shade val="50000"/>
+            </a:schemeClr>
+          </a:lnRef>
+          <a:fillRef idx="1">
+            <a:schemeClr val="accent1"/>
+          </a:fillRef>
+          <a:effectRef idx="0">
+            <a:schemeClr val="accent1"/>
+          </a:effectRef>
+          <a:fontRef idx="minor">
+            <a:schemeClr val="lt1"/>
+          </a:fontRef>
+        </p:style>
+        <p:txBody>
+          <a:bodyPr rtlCol="0" anchor="ctr"/>
+          <a:lstStyle/>
+          <a:p>
+            <a:pPr algn="ctr"/>
+            <a:endParaRPr lang="en-US"/>
+          </a:p>
+        </p:txBody>
+      </p:sp>
+      <p:sp>
+        <p:nvSpPr>
+          <p:cNvPr id="19" name="Oval 18">
+            <a:extLst>
+              <a:ext uri="{FF2B5EF4-FFF2-40B4-BE49-F238E27FC236}">
+                <a16:creationId xmlns:a16="http://schemas.microsoft.com/office/drawing/2014/main" id="{48844505-07B5-4F60-8809-3CA2D031ED6F}"/>
+              </a:ext>
+              <a:ext uri="{C183D7F6-B498-43B3-948B-1728B52AA6E4}">
+                <adec:decorative xmlns:adec="http://schemas.microsoft.com/office/drawing/2017/decorative" val="1"/>
+              </a:ext>
+            </a:extLst>
+          </p:cNvPr>
+          <p:cNvSpPr>
+            <a:spLocks noGrp="1" noRot="1" noChangeAspect="1" noMove="1" noResize="1" noEditPoints="1" noAdjustHandles="1" noChangeArrowheads="1" noChangeShapeType="1" noTextEdit="1"/>
+          </p:cNvSpPr>
+          <p:nvPr>
+            <p:extLst>
+              <p:ext uri="{386F3935-93C4-4BCD-93E2-E3B085C9AB24}">
+                <p16:designElem xmlns:p16="http://schemas.microsoft.com/office/powerpoint/2015/main" val="1"/>
+              </p:ext>
+            </p:extLst>
+          </p:nvPr>
+        </p:nvSpPr>
+        <p:spPr>
+          <a:xfrm rot="12508972">
+            <a:off x="652110" y="716188"/>
+            <a:ext cx="5005754" cy="5005754"/>
+          </a:xfrm>
+          <a:prstGeom prst="ellipse">
+            <a:avLst/>
+          </a:prstGeom>
+          <a:gradFill>
+            <a:gsLst>
+              <a:gs pos="31000">
+                <a:schemeClr val="accent6">
+                  <a:alpha val="0"/>
+                </a:schemeClr>
+              </a:gs>
+              <a:gs pos="85000">
+                <a:schemeClr val="accent6">
+                  <a:lumMod val="60000"/>
+                  <a:lumOff val="40000"/>
+                  <a:alpha val="23000"/>
+                </a:schemeClr>
+              </a:gs>
+            </a:gsLst>
+            <a:lin ang="11400000" scaled="0"/>
+          </a:gradFill>
+          <a:ln>
+            <a:noFill/>
+          </a:ln>
+        </p:spPr>
+        <p:style>
+          <a:lnRef idx="2">
+            <a:schemeClr val="accent1">
+              <a:shade val="50000"/>
+            </a:schemeClr>
+          </a:lnRef>
+          <a:fillRef idx="1">
+            <a:schemeClr val="accent1"/>
+          </a:fillRef>
+          <a:effectRef idx="0">
+            <a:schemeClr val="accent1"/>
+          </a:effectRef>
+          <a:fontRef idx="minor">
+            <a:schemeClr val="lt1"/>
+          </a:fontRef>
+        </p:style>
+        <p:txBody>
+          <a:bodyPr rtlCol="0" anchor="ctr"/>
+          <a:lstStyle/>
+          <a:p>
+            <a:pPr algn="ctr"/>
+            <a:endParaRPr lang="en-US" dirty="0"/>
+          </a:p>
+        </p:txBody>
+      </p:sp>
+    </p:spTree>
+    <p:extLst>
+      <p:ext uri="{BB962C8B-B14F-4D97-AF65-F5344CB8AC3E}">
+        <p14:creationId xmlns:p14="http://schemas.microsoft.com/office/powerpoint/2010/main" val="271114197"/>
+      </p:ext>
+    </p:extLst>
+  </p:cSld>
+  <p:clrMapOvr>
+    <a:masterClrMapping/>
+  </p:clrMapOvr>
+</p:sld>
+</file>
+
 <file path=ppt/slides/slide2.xml><?xml version="1.0" encoding="utf-8"?>
 <p:sld xmlns:a="http://schemas.openxmlformats.org/drawingml/2006/main" xmlns:r="http://schemas.openxmlformats.org/officeDocument/2006/relationships" xmlns:p="http://schemas.openxmlformats.org/presentationml/2006/main">
   <p:cSld>
@@ -4712,364 +8515,41 @@
           </a:p>
         </p:txBody>
       </p:sp>
-      <p:sp>
-        <p:nvSpPr>
-          <p:cNvPr id="4" name="Rectangle 1">
-            <a:extLst>
-              <a:ext uri="{FF2B5EF4-FFF2-40B4-BE49-F238E27FC236}">
-                <a16:creationId xmlns:a16="http://schemas.microsoft.com/office/drawing/2014/main" id="{FAF0877E-EB10-73F9-0EAC-5616D09CAB03}"/>
-              </a:ext>
-            </a:extLst>
-          </p:cNvPr>
-          <p:cNvSpPr>
-            <a:spLocks noGrp="1" noChangeArrowheads="1"/>
-          </p:cNvSpPr>
+      <p:pic>
+        <p:nvPicPr>
+          <p:cNvPr id="6" name="Espaço Reservado para Conteúdo 5" descr="Interface gráfica do usuário, Aplicativo, Teams&#10;&#10;Descrição gerada automaticamente">
+            <a:extLst>
+              <a:ext uri="{FF2B5EF4-FFF2-40B4-BE49-F238E27FC236}">
+                <a16:creationId xmlns:a16="http://schemas.microsoft.com/office/drawing/2014/main" id="{3B436066-50E7-8621-D8DF-D9481B8E9BF7}"/>
+              </a:ext>
+            </a:extLst>
+          </p:cNvPr>
+          <p:cNvPicPr>
+            <a:picLocks noGrp="1" noChangeAspect="1"/>
+          </p:cNvPicPr>
           <p:nvPr>
             <p:ph idx="1"/>
           </p:nvPr>
-        </p:nvSpPr>
-        <p:spPr bwMode="auto">
+        </p:nvPicPr>
+        <p:blipFill>
+          <a:blip r:embed="rId2">
+            <a:extLst>
+              <a:ext uri="{28A0092B-C50C-407E-A947-70E740481C1C}">
+                <a14:useLocalDpi xmlns:a14="http://schemas.microsoft.com/office/drawing/2010/main" val="0"/>
+              </a:ext>
+            </a:extLst>
+          </a:blip>
+          <a:stretch>
+            <a:fillRect/>
+          </a:stretch>
+        </p:blipFill>
+        <p:spPr>
           <a:xfrm>
-            <a:off x="1371600" y="3214777"/>
-            <a:ext cx="9959842" cy="1754326"/>
+            <a:off x="1481951" y="2112963"/>
+            <a:ext cx="10020260" cy="3959225"/>
           </a:xfrm>
-          <a:prstGeom prst="rect">
-            <a:avLst/>
-          </a:prstGeom>
-          <a:noFill/>
-          <a:ln>
-            <a:noFill/>
-          </a:ln>
-          <a:effectLst/>
-          <a:extLst>
-            <a:ext uri="{909E8E84-426E-40DD-AFC4-6F175D3DCCD1}">
-              <a14:hiddenFill xmlns:a14="http://schemas.microsoft.com/office/drawing/2010/main">
-                <a:solidFill>
-                  <a:schemeClr val="accent1"/>
-                </a:solidFill>
-              </a14:hiddenFill>
-            </a:ext>
-            <a:ext uri="{91240B29-F687-4F45-9708-019B960494DF}">
-              <a14:hiddenLine xmlns:a14="http://schemas.microsoft.com/office/drawing/2010/main" w="9525">
-                <a:solidFill>
-                  <a:schemeClr val="tx1"/>
-                </a:solidFill>
-                <a:miter lim="800000"/>
-                <a:headEnd/>
-                <a:tailEnd/>
-              </a14:hiddenLine>
-            </a:ext>
-            <a:ext uri="{AF507438-7753-43E0-B8FC-AC1667EBCBE1}">
-              <a14:hiddenEffects xmlns:a14="http://schemas.microsoft.com/office/drawing/2010/main">
-                <a:effectLst>
-                  <a:outerShdw dist="35921" dir="2700000" algn="ctr" rotWithShape="0">
-                    <a:schemeClr val="bg2"/>
-                  </a:outerShdw>
-                </a:effectLst>
-              </a14:hiddenEffects>
-            </a:ext>
-          </a:extLst>
         </p:spPr>
-        <p:txBody>
-          <a:bodyPr vert="horz" wrap="none" lIns="91440" tIns="45720" rIns="91440" bIns="45720" numCol="1" anchor="ctr" anchorCtr="0" compatLnSpc="1">
-            <a:prstTxWarp prst="textNoShape">
-              <a:avLst/>
-            </a:prstTxWarp>
-            <a:spAutoFit/>
-          </a:bodyPr>
-          <a:lstStyle/>
-          <a:p>
-            <a:pPr marL="0" marR="0" lvl="0" indent="0" algn="l" defTabSz="914400" rtl="0" eaLnBrk="0" fontAlgn="base" latinLnBrk="0" hangingPunct="0">
-              <a:lnSpc>
-                <a:spcPct val="100000"/>
-              </a:lnSpc>
-              <a:spcBef>
-                <a:spcPct val="0"/>
-              </a:spcBef>
-              <a:spcAft>
-                <a:spcPct val="0"/>
-              </a:spcAft>
-              <a:buClrTx/>
-              <a:buSzTx/>
-              <a:buFontTx/>
-              <a:buChar char="•"/>
-              <a:tabLst/>
-            </a:pPr>
-            <a:r>
-              <a:rPr kumimoji="0" lang="pt-BR" altLang="pt-BR" sz="1800" b="1" i="0" u="none" strike="noStrike" cap="none" normalizeH="0" baseline="0" dirty="0">
-                <a:ln>
-                  <a:noFill/>
-                </a:ln>
-                <a:solidFill>
-                  <a:srgbClr val="FF0000"/>
-                </a:solidFill>
-                <a:effectLst/>
-                <a:latin typeface="Arial" panose="020B0604020202020204" pitchFamily="34" charset="0"/>
-              </a:rPr>
-              <a:t>Interface</a:t>
-            </a:r>
-            <a:r>
-              <a:rPr kumimoji="0" lang="pt-BR" altLang="pt-BR" sz="1800" b="0" i="0" u="none" strike="noStrike" cap="none" normalizeH="0" baseline="0" dirty="0">
-                <a:ln>
-                  <a:noFill/>
-                </a:ln>
-                <a:solidFill>
-                  <a:srgbClr val="FF0000"/>
-                </a:solidFill>
-                <a:effectLst/>
-                <a:latin typeface="Arial" panose="020B0604020202020204" pitchFamily="34" charset="0"/>
-              </a:rPr>
-              <a:t>: Apresentar esboços ou </a:t>
-            </a:r>
-            <a:r>
-              <a:rPr kumimoji="0" lang="pt-BR" altLang="pt-BR" sz="1800" b="0" i="0" u="none" strike="noStrike" cap="none" normalizeH="0" baseline="0" dirty="0" err="1">
-                <a:ln>
-                  <a:noFill/>
-                </a:ln>
-                <a:solidFill>
-                  <a:srgbClr val="FF0000"/>
-                </a:solidFill>
-                <a:effectLst/>
-                <a:latin typeface="Arial" panose="020B0604020202020204" pitchFamily="34" charset="0"/>
-              </a:rPr>
-              <a:t>wireframes</a:t>
-            </a:r>
-            <a:r>
-              <a:rPr kumimoji="0" lang="pt-BR" altLang="pt-BR" sz="1800" b="0" i="0" u="none" strike="noStrike" cap="none" normalizeH="0" baseline="0" dirty="0">
-                <a:ln>
-                  <a:noFill/>
-                </a:ln>
-                <a:solidFill>
-                  <a:srgbClr val="FF0000"/>
-                </a:solidFill>
-                <a:effectLst/>
-                <a:latin typeface="Arial" panose="020B0604020202020204" pitchFamily="34" charset="0"/>
-              </a:rPr>
-              <a:t> das principais telas (descoberta, pedidos, perfil).</a:t>
-            </a:r>
-          </a:p>
-          <a:p>
-            <a:pPr marL="0" marR="0" lvl="0" indent="0" algn="l" defTabSz="914400" rtl="0" eaLnBrk="0" fontAlgn="base" latinLnBrk="0" hangingPunct="0">
-              <a:lnSpc>
-                <a:spcPct val="100000"/>
-              </a:lnSpc>
-              <a:spcBef>
-                <a:spcPct val="0"/>
-              </a:spcBef>
-              <a:spcAft>
-                <a:spcPct val="0"/>
-              </a:spcAft>
-              <a:buClrTx/>
-              <a:buSzTx/>
-              <a:buFontTx/>
-              <a:buChar char="•"/>
-              <a:tabLst/>
-            </a:pPr>
-            <a:r>
-              <a:rPr kumimoji="0" lang="pt-BR" altLang="pt-BR" sz="1800" b="1" i="0" u="none" strike="noStrike" cap="none" normalizeH="0" baseline="0" dirty="0">
-                <a:ln>
-                  <a:noFill/>
-                </a:ln>
-                <a:solidFill>
-                  <a:srgbClr val="FF0000"/>
-                </a:solidFill>
-                <a:effectLst/>
-                <a:latin typeface="Arial" panose="020B0604020202020204" pitchFamily="34" charset="0"/>
-              </a:rPr>
-              <a:t>Arquitetura</a:t>
-            </a:r>
-            <a:r>
-              <a:rPr kumimoji="0" lang="pt-BR" altLang="pt-BR" sz="1800" b="0" i="0" u="none" strike="noStrike" cap="none" normalizeH="0" baseline="0" dirty="0">
-                <a:ln>
-                  <a:noFill/>
-                </a:ln>
-                <a:solidFill>
-                  <a:srgbClr val="FF0000"/>
-                </a:solidFill>
-                <a:effectLst/>
-                <a:latin typeface="Arial" panose="020B0604020202020204" pitchFamily="34" charset="0"/>
-              </a:rPr>
-              <a:t>: Mostrar a estrutura básica da arquitetura do sistema.</a:t>
-            </a:r>
-          </a:p>
-          <a:p>
-            <a:pPr marL="0" marR="0" lvl="0" indent="0" algn="l" defTabSz="914400" rtl="0" eaLnBrk="0" fontAlgn="base" latinLnBrk="0" hangingPunct="0">
-              <a:lnSpc>
-                <a:spcPct val="100000"/>
-              </a:lnSpc>
-              <a:spcBef>
-                <a:spcPct val="0"/>
-              </a:spcBef>
-              <a:spcAft>
-                <a:spcPct val="0"/>
-              </a:spcAft>
-              <a:buClrTx/>
-              <a:buSzTx/>
-              <a:buFontTx/>
-              <a:buChar char="•"/>
-              <a:tabLst/>
-            </a:pPr>
-            <a:r>
-              <a:rPr kumimoji="0" lang="pt-BR" altLang="pt-BR" sz="1800" b="1" i="0" u="none" strike="noStrike" cap="none" normalizeH="0" baseline="0" dirty="0">
-                <a:ln>
-                  <a:noFill/>
-                </a:ln>
-                <a:solidFill>
-                  <a:srgbClr val="FF0000"/>
-                </a:solidFill>
-                <a:effectLst/>
-                <a:latin typeface="Arial" panose="020B0604020202020204" pitchFamily="34" charset="0"/>
-              </a:rPr>
-              <a:t>Fluxograma</a:t>
-            </a:r>
-            <a:r>
-              <a:rPr kumimoji="0" lang="pt-BR" altLang="pt-BR" sz="1800" b="0" i="0" u="none" strike="noStrike" cap="none" normalizeH="0" baseline="0" dirty="0">
-                <a:ln>
-                  <a:noFill/>
-                </a:ln>
-                <a:solidFill>
-                  <a:srgbClr val="FF0000"/>
-                </a:solidFill>
-                <a:effectLst/>
-                <a:latin typeface="Arial" panose="020B0604020202020204" pitchFamily="34" charset="0"/>
-              </a:rPr>
-              <a:t>: Apresentar o fluxo do usuário, desde a descoberta de um local até o pagamento.</a:t>
-            </a:r>
-          </a:p>
-          <a:p>
-            <a:pPr marL="0" marR="0" lvl="0" indent="0" algn="l" defTabSz="914400" rtl="0" eaLnBrk="0" fontAlgn="base" latinLnBrk="0" hangingPunct="0">
-              <a:lnSpc>
-                <a:spcPct val="100000"/>
-              </a:lnSpc>
-              <a:spcBef>
-                <a:spcPct val="0"/>
-              </a:spcBef>
-              <a:spcAft>
-                <a:spcPct val="0"/>
-              </a:spcAft>
-              <a:buClrTx/>
-              <a:buSzTx/>
-              <a:buFontTx/>
-              <a:buChar char="•"/>
-              <a:tabLst/>
-            </a:pPr>
-            <a:r>
-              <a:rPr kumimoji="0" lang="pt-BR" altLang="pt-BR" sz="1800" b="1" i="0" u="none" strike="noStrike" cap="none" normalizeH="0" baseline="0" dirty="0">
-                <a:ln>
-                  <a:noFill/>
-                </a:ln>
-                <a:solidFill>
-                  <a:srgbClr val="FF0000"/>
-                </a:solidFill>
-                <a:effectLst/>
-                <a:latin typeface="Arial" panose="020B0604020202020204" pitchFamily="34" charset="0"/>
-              </a:rPr>
-              <a:t>Diagrama MER</a:t>
-            </a:r>
-            <a:r>
-              <a:rPr kumimoji="0" lang="pt-BR" altLang="pt-BR" sz="1800" b="0" i="0" u="none" strike="noStrike" cap="none" normalizeH="0" baseline="0" dirty="0">
-                <a:ln>
-                  <a:noFill/>
-                </a:ln>
-                <a:solidFill>
-                  <a:srgbClr val="FF0000"/>
-                </a:solidFill>
-                <a:effectLst/>
-                <a:latin typeface="Arial" panose="020B0604020202020204" pitchFamily="34" charset="0"/>
-              </a:rPr>
-              <a:t>: (s</a:t>
-            </a:r>
-            <a:r>
-              <a:rPr lang="pt-BR" sz="1600" dirty="0">
-                <a:solidFill>
-                  <a:srgbClr val="FF0000"/>
-                </a:solidFill>
-              </a:rPr>
-              <a:t>e disponível) Exibir as principais entidades e relações do banco de dados.</a:t>
-            </a:r>
-            <a:r>
-              <a:rPr kumimoji="0" lang="pt-BR" altLang="pt-BR" sz="1800" b="0" i="0" u="none" strike="noStrike" cap="none" normalizeH="0" baseline="0" dirty="0">
-                <a:ln>
-                  <a:noFill/>
-                </a:ln>
-                <a:solidFill>
-                  <a:srgbClr val="FF0000"/>
-                </a:solidFill>
-                <a:effectLst/>
-                <a:latin typeface="Arial" panose="020B0604020202020204" pitchFamily="34" charset="0"/>
-              </a:rPr>
-              <a:t> </a:t>
-            </a:r>
-          </a:p>
-          <a:p>
-            <a:pPr marL="0" marR="0" lvl="0" indent="0" algn="l" defTabSz="914400" rtl="0" eaLnBrk="0" fontAlgn="base" latinLnBrk="0" hangingPunct="0">
-              <a:lnSpc>
-                <a:spcPct val="100000"/>
-              </a:lnSpc>
-              <a:spcBef>
-                <a:spcPct val="0"/>
-              </a:spcBef>
-              <a:spcAft>
-                <a:spcPct val="0"/>
-              </a:spcAft>
-              <a:buClrTx/>
-              <a:buSzTx/>
-              <a:buFontTx/>
-              <a:buChar char="•"/>
-              <a:tabLst/>
-            </a:pPr>
-            <a:endParaRPr lang="pt-BR" altLang="pt-BR" sz="1800" dirty="0">
-              <a:solidFill>
-                <a:srgbClr val="FF0000"/>
-              </a:solidFill>
-              <a:latin typeface="Arial" panose="020B0604020202020204" pitchFamily="34" charset="0"/>
-            </a:endParaRPr>
-          </a:p>
-          <a:p>
-            <a:pPr marL="0" marR="0" lvl="0" indent="0" algn="l" defTabSz="914400" rtl="0" eaLnBrk="0" fontAlgn="base" latinLnBrk="0" hangingPunct="0">
-              <a:lnSpc>
-                <a:spcPct val="100000"/>
-              </a:lnSpc>
-              <a:spcBef>
-                <a:spcPct val="0"/>
-              </a:spcBef>
-              <a:spcAft>
-                <a:spcPct val="0"/>
-              </a:spcAft>
-              <a:buClrTx/>
-              <a:buSzTx/>
-              <a:buNone/>
-              <a:tabLst/>
-            </a:pPr>
-            <a:r>
-              <a:rPr kumimoji="0" lang="pt-BR" altLang="pt-BR" sz="1800" b="0" i="0" u="none" strike="noStrike" cap="none" normalizeH="0" baseline="0" dirty="0" err="1">
-                <a:ln>
-                  <a:noFill/>
-                </a:ln>
-                <a:solidFill>
-                  <a:srgbClr val="FF0000"/>
-                </a:solidFill>
-                <a:effectLst/>
-                <a:latin typeface="Arial" panose="020B0604020202020204" pitchFamily="34" charset="0"/>
-              </a:rPr>
-              <a:t>Prox</a:t>
-            </a:r>
-            <a:r>
-              <a:rPr kumimoji="0" lang="pt-BR" altLang="pt-BR" sz="1800" b="0" i="0" u="none" strike="noStrike" cap="none" normalizeH="0" baseline="0" dirty="0">
-                <a:ln>
-                  <a:noFill/>
-                </a:ln>
-                <a:solidFill>
-                  <a:srgbClr val="FF0000"/>
-                </a:solidFill>
-                <a:effectLst/>
-                <a:latin typeface="Arial" panose="020B0604020202020204" pitchFamily="34" charset="0"/>
-              </a:rPr>
-              <a:t> sprint</a:t>
-            </a:r>
-          </a:p>
-        </p:txBody>
-      </p:sp>
+      </p:pic>
     </p:spTree>
     <p:extLst>
       <p:ext uri="{BB962C8B-B14F-4D97-AF65-F5344CB8AC3E}">
@@ -5105,7 +8585,7 @@
           <p:cNvPr id="2" name="Título 1">
             <a:extLst>
               <a:ext uri="{FF2B5EF4-FFF2-40B4-BE49-F238E27FC236}">
-                <a16:creationId xmlns:a16="http://schemas.microsoft.com/office/drawing/2014/main" id="{2D3CD02A-55DB-4BEC-982B-6BC479725D11}"/>
+                <a16:creationId xmlns:a16="http://schemas.microsoft.com/office/drawing/2014/main" id="{A0FFCA12-813B-EDA4-EC64-2F085F1B3586}"/>
               </a:ext>
             </a:extLst>
           </p:cNvPr>
@@ -5123,52 +8603,45 @@
           <a:p>
             <a:r>
               <a:rPr lang="pt-BR" dirty="0"/>
-              <a:t>Conclusão</a:t>
-            </a:r>
-          </a:p>
-        </p:txBody>
-      </p:sp>
-      <p:sp>
-        <p:nvSpPr>
-          <p:cNvPr id="3" name="Espaço Reservado para Conteúdo 2">
-            <a:extLst>
-              <a:ext uri="{FF2B5EF4-FFF2-40B4-BE49-F238E27FC236}">
-                <a16:creationId xmlns:a16="http://schemas.microsoft.com/office/drawing/2014/main" id="{F3DB7D3C-A8DC-C837-6393-4C4209C00CEC}"/>
-              </a:ext>
-            </a:extLst>
-          </p:cNvPr>
-          <p:cNvSpPr>
-            <a:spLocks noGrp="1"/>
-          </p:cNvSpPr>
-          <p:nvPr>
-            <p:ph idx="1"/>
-          </p:nvPr>
-        </p:nvSpPr>
-        <p:spPr/>
-        <p:txBody>
-          <a:bodyPr/>
-          <a:lstStyle/>
-          <a:p>
-            <a:r>
-              <a:rPr lang="pt-BR" dirty="0"/>
-              <a:t>Proposta de valor</a:t>
-            </a:r>
-          </a:p>
-          <a:p>
-            <a:r>
-              <a:rPr lang="pt-BR" dirty="0"/>
-              <a:t>Próximos passos no desenvolvimento</a:t>
-            </a:r>
-          </a:p>
-          <a:p>
-            <a:endParaRPr lang="pt-BR" dirty="0"/>
-          </a:p>
-        </p:txBody>
-      </p:sp>
+              <a:t>Rascunhos Iniciais</a:t>
+            </a:r>
+          </a:p>
+        </p:txBody>
+      </p:sp>
+      <p:pic>
+        <p:nvPicPr>
+          <p:cNvPr id="5" name="Imagem 4">
+            <a:extLst>
+              <a:ext uri="{FF2B5EF4-FFF2-40B4-BE49-F238E27FC236}">
+                <a16:creationId xmlns:a16="http://schemas.microsoft.com/office/drawing/2014/main" id="{ED3147C2-357B-61A7-C36E-95A480E9BA04}"/>
+              </a:ext>
+            </a:extLst>
+          </p:cNvPr>
+          <p:cNvPicPr>
+            <a:picLocks noChangeAspect="1"/>
+          </p:cNvPicPr>
+          <p:nvPr/>
+        </p:nvPicPr>
+        <p:blipFill>
+          <a:blip r:embed="rId2"/>
+          <a:stretch>
+            <a:fillRect/>
+          </a:stretch>
+        </p:blipFill>
+        <p:spPr>
+          <a:xfrm>
+            <a:off x="1257027" y="2260226"/>
+            <a:ext cx="5515745" cy="2562583"/>
+          </a:xfrm>
+          <a:prstGeom prst="rect">
+            <a:avLst/>
+          </a:prstGeom>
+        </p:spPr>
+      </p:pic>
     </p:spTree>
     <p:extLst>
       <p:ext uri="{BB962C8B-B14F-4D97-AF65-F5344CB8AC3E}">
-        <p14:creationId xmlns:p14="http://schemas.microsoft.com/office/powerpoint/2010/main" val="800741475"/>
+        <p14:creationId xmlns:p14="http://schemas.microsoft.com/office/powerpoint/2010/main" val="4083330300"/>
       </p:ext>
     </p:extLst>
   </p:cSld>
@@ -5200,7 +8673,7 @@
           <p:cNvPr id="2" name="Título 1">
             <a:extLst>
               <a:ext uri="{FF2B5EF4-FFF2-40B4-BE49-F238E27FC236}">
-                <a16:creationId xmlns:a16="http://schemas.microsoft.com/office/drawing/2014/main" id="{FA14C450-71FA-B380-742A-72B83598B0C9}"/>
+                <a16:creationId xmlns:a16="http://schemas.microsoft.com/office/drawing/2014/main" id="{A0FFCA12-813B-EDA4-EC64-2F085F1B3586}"/>
               </a:ext>
             </a:extLst>
           </p:cNvPr>
@@ -5211,28 +8684,57 @@
             <p:ph type="title"/>
           </p:nvPr>
         </p:nvSpPr>
+        <p:spPr/>
+        <p:txBody>
+          <a:bodyPr/>
+          <a:lstStyle/>
+          <a:p>
+            <a:r>
+              <a:rPr lang="pt-BR" dirty="0"/>
+              <a:t>Rascunhos Iniciais</a:t>
+            </a:r>
+          </a:p>
+        </p:txBody>
+      </p:sp>
+      <p:pic>
+        <p:nvPicPr>
+          <p:cNvPr id="5" name="Espaço Reservado para Conteúdo 4" descr="Diagrama, Esquemático&#10;&#10;Descrição gerada automaticamente">
+            <a:extLst>
+              <a:ext uri="{FF2B5EF4-FFF2-40B4-BE49-F238E27FC236}">
+                <a16:creationId xmlns:a16="http://schemas.microsoft.com/office/drawing/2014/main" id="{649894FC-44F3-39B6-649D-188D5FD6ABE1}"/>
+              </a:ext>
+            </a:extLst>
+          </p:cNvPr>
+          <p:cNvPicPr>
+            <a:picLocks noGrp="1" noChangeAspect="1"/>
+          </p:cNvPicPr>
+          <p:nvPr>
+            <p:ph idx="1"/>
+          </p:nvPr>
+        </p:nvPicPr>
+        <p:blipFill>
+          <a:blip r:embed="rId2">
+            <a:extLst>
+              <a:ext uri="{28A0092B-C50C-407E-A947-70E740481C1C}">
+                <a14:useLocalDpi xmlns:a14="http://schemas.microsoft.com/office/drawing/2010/main" val="0"/>
+              </a:ext>
+            </a:extLst>
+          </a:blip>
+          <a:stretch>
+            <a:fillRect/>
+          </a:stretch>
+        </p:blipFill>
         <p:spPr>
           <a:xfrm>
-            <a:off x="975360" y="2468880"/>
-            <a:ext cx="10241280" cy="1234440"/>
+            <a:off x="4163126" y="2112963"/>
+            <a:ext cx="4657911" cy="3959225"/>
           </a:xfrm>
         </p:spPr>
-        <p:txBody>
-          <a:bodyPr/>
-          <a:lstStyle/>
-          <a:p>
-            <a:pPr algn="ctr"/>
-            <a:r>
-              <a:rPr lang="pt-BR" dirty="0"/>
-              <a:t>Obrigado!</a:t>
-            </a:r>
-          </a:p>
-        </p:txBody>
-      </p:sp>
+      </p:pic>
     </p:spTree>
     <p:extLst>
       <p:ext uri="{BB962C8B-B14F-4D97-AF65-F5344CB8AC3E}">
-        <p14:creationId xmlns:p14="http://schemas.microsoft.com/office/powerpoint/2010/main" val="271114197"/>
+        <p14:creationId xmlns:p14="http://schemas.microsoft.com/office/powerpoint/2010/main" val="3700557500"/>
       </p:ext>
     </p:extLst>
   </p:cSld>

</xml_diff>